<commit_message>
changes on the report
Addition of table.
</commit_message>
<xml_diff>
--- a/G2M insight for Cab Investment firm.pptx
+++ b/G2M insight for Cab Investment firm.pptx
@@ -7,19 +7,23 @@
   <p:sldIdLst>
     <p:sldId id="256" r:id="rId2"/>
     <p:sldId id="263" r:id="rId3"/>
-    <p:sldId id="257" r:id="rId4"/>
-    <p:sldId id="258" r:id="rId5"/>
-    <p:sldId id="259" r:id="rId6"/>
-    <p:sldId id="260" r:id="rId7"/>
-    <p:sldId id="261" r:id="rId8"/>
-    <p:sldId id="262" r:id="rId9"/>
-    <p:sldId id="264" r:id="rId10"/>
-    <p:sldId id="267" r:id="rId11"/>
-    <p:sldId id="265" r:id="rId12"/>
-    <p:sldId id="266" r:id="rId13"/>
-    <p:sldId id="268" r:id="rId14"/>
-    <p:sldId id="269" r:id="rId15"/>
-    <p:sldId id="270" r:id="rId16"/>
+    <p:sldId id="271" r:id="rId4"/>
+    <p:sldId id="257" r:id="rId5"/>
+    <p:sldId id="258" r:id="rId6"/>
+    <p:sldId id="272" r:id="rId7"/>
+    <p:sldId id="259" r:id="rId8"/>
+    <p:sldId id="260" r:id="rId9"/>
+    <p:sldId id="261" r:id="rId10"/>
+    <p:sldId id="262" r:id="rId11"/>
+    <p:sldId id="273" r:id="rId12"/>
+    <p:sldId id="264" r:id="rId13"/>
+    <p:sldId id="274" r:id="rId14"/>
+    <p:sldId id="267" r:id="rId15"/>
+    <p:sldId id="265" r:id="rId16"/>
+    <p:sldId id="266" r:id="rId17"/>
+    <p:sldId id="268" r:id="rId18"/>
+    <p:sldId id="269" r:id="rId19"/>
+    <p:sldId id="270" r:id="rId20"/>
   </p:sldIdLst>
   <p:sldSz cx="12192000" cy="6858000"/>
   <p:notesSz cx="6858000" cy="9144000"/>
@@ -636,7 +640,7 @@
       </c:valAx>
       <c:spPr>
         <a:noFill/>
-        <a:ln>
+        <a:ln w="25400">
           <a:noFill/>
         </a:ln>
         <a:effectLst/>
@@ -5789,19 +5793,33 @@
         <p:spPr>
           <a:xfrm>
             <a:off x="477980" y="4872922"/>
-            <a:ext cx="4023359" cy="1208141"/>
+            <a:ext cx="4023359" cy="1743031"/>
           </a:xfrm>
         </p:spPr>
         <p:txBody>
           <a:bodyPr>
-            <a:normAutofit/>
+            <a:normAutofit lnSpcReduction="10000"/>
           </a:bodyPr>
           <a:lstStyle/>
+          <a:p>
+            <a:pPr algn="l"/>
+            <a:r>
+              <a:rPr lang="en-US" sz="3600" dirty="0"/>
+              <a:t>Mark Kimutai Kitur</a:t>
+            </a:r>
+          </a:p>
           <a:p>
             <a:pPr algn="l"/>
             <a:r>
               <a:rPr lang="en-US" sz="3600" dirty="0"/>
               <a:t>08/05/2024</a:t>
+            </a:r>
+          </a:p>
+          <a:p>
+            <a:pPr algn="l"/>
+            <a:r>
+              <a:rPr lang="en-US" sz="3600" dirty="0"/>
+              <a:t>LISUM33</a:t>
             </a:r>
             <a:endParaRPr lang="en-KE" sz="3600" dirty="0"/>
           </a:p>
@@ -6074,6 +6092,1587 @@
 </file>
 
 <file path=ppt/slides/slide10.xml><?xml version="1.0" encoding="utf-8"?>
+<p:sld xmlns:a="http://schemas.openxmlformats.org/drawingml/2006/main" xmlns:r="http://schemas.openxmlformats.org/officeDocument/2006/relationships" xmlns:p="http://schemas.openxmlformats.org/presentationml/2006/main">
+  <p:cSld>
+    <p:spTree>
+      <p:nvGrpSpPr>
+        <p:cNvPr id="1" name=""/>
+        <p:cNvGrpSpPr/>
+        <p:nvPr/>
+      </p:nvGrpSpPr>
+      <p:grpSpPr>
+        <a:xfrm>
+          <a:off x="0" y="0"/>
+          <a:ext cx="0" cy="0"/>
+          <a:chOff x="0" y="0"/>
+          <a:chExt cx="0" cy="0"/>
+        </a:xfrm>
+      </p:grpSpPr>
+      <p:sp>
+        <p:nvSpPr>
+          <p:cNvPr id="2" name="Title 1">
+            <a:extLst>
+              <a:ext uri="{FF2B5EF4-FFF2-40B4-BE49-F238E27FC236}">
+                <a16:creationId xmlns:a16="http://schemas.microsoft.com/office/drawing/2014/main" id="{286EF2C1-7214-1F0E-C106-2CF1F8584584}"/>
+              </a:ext>
+            </a:extLst>
+          </p:cNvPr>
+          <p:cNvSpPr>
+            <a:spLocks noGrp="1"/>
+          </p:cNvSpPr>
+          <p:nvPr>
+            <p:ph type="title"/>
+          </p:nvPr>
+        </p:nvSpPr>
+        <p:spPr/>
+        <p:txBody>
+          <a:bodyPr/>
+          <a:lstStyle/>
+          <a:p>
+            <a:r>
+              <a:rPr lang="en-US" dirty="0">
+                <a:latin typeface="Abadi" panose="020B0604020104020204" pitchFamily="34" charset="0"/>
+              </a:rPr>
+              <a:t>People below 40 years earn less income </a:t>
+            </a:r>
+            <a:endParaRPr lang="en-KE" dirty="0">
+              <a:latin typeface="Abadi" panose="020B0604020104020204" pitchFamily="34" charset="0"/>
+            </a:endParaRPr>
+          </a:p>
+        </p:txBody>
+      </p:sp>
+      <p:pic>
+        <p:nvPicPr>
+          <p:cNvPr id="6" name="Content Placeholder 5" descr="A graph of age vs income&#10;&#10;Description automatically generated">
+            <a:extLst>
+              <a:ext uri="{FF2B5EF4-FFF2-40B4-BE49-F238E27FC236}">
+                <a16:creationId xmlns:a16="http://schemas.microsoft.com/office/drawing/2014/main" id="{591737C7-3E2F-584B-F0D2-4A4D57EF1B89}"/>
+              </a:ext>
+            </a:extLst>
+          </p:cNvPr>
+          <p:cNvPicPr>
+            <a:picLocks noGrp="1" noChangeAspect="1"/>
+          </p:cNvPicPr>
+          <p:nvPr>
+            <p:ph idx="1"/>
+          </p:nvPr>
+        </p:nvPicPr>
+        <p:blipFill>
+          <a:blip r:embed="rId2">
+            <a:extLst>
+              <a:ext uri="{28A0092B-C50C-407E-A947-70E740481C1C}">
+                <a14:useLocalDpi xmlns:a14="http://schemas.microsoft.com/office/drawing/2010/main" val="0"/>
+              </a:ext>
+            </a:extLst>
+          </a:blip>
+          <a:stretch>
+            <a:fillRect/>
+          </a:stretch>
+        </p:blipFill>
+        <p:spPr>
+          <a:xfrm>
+            <a:off x="5576374" y="1343973"/>
+            <a:ext cx="5385827" cy="4160528"/>
+          </a:xfrm>
+        </p:spPr>
+      </p:pic>
+      <p:sp>
+        <p:nvSpPr>
+          <p:cNvPr id="4" name="Text Placeholder 3">
+            <a:extLst>
+              <a:ext uri="{FF2B5EF4-FFF2-40B4-BE49-F238E27FC236}">
+                <a16:creationId xmlns:a16="http://schemas.microsoft.com/office/drawing/2014/main" id="{89C988BC-9B8D-AD50-5051-416BF630423A}"/>
+              </a:ext>
+            </a:extLst>
+          </p:cNvPr>
+          <p:cNvSpPr>
+            <a:spLocks noGrp="1"/>
+          </p:cNvSpPr>
+          <p:nvPr>
+            <p:ph type="body" sz="half" idx="2"/>
+          </p:nvPr>
+        </p:nvSpPr>
+        <p:spPr/>
+        <p:txBody>
+          <a:bodyPr/>
+          <a:lstStyle/>
+          <a:p>
+            <a:pPr marL="285750" indent="-285750">
+              <a:buFont typeface="Wingdings" panose="05000000000000000000" pitchFamily="2" charset="2"/>
+              <a:buChar char="§"/>
+            </a:pPr>
+            <a:r>
+              <a:rPr lang="en-US" dirty="0"/>
+              <a:t>Less expensive products should be manufactured to improve stocking.</a:t>
+            </a:r>
+            <a:endParaRPr lang="en-KE" dirty="0"/>
+          </a:p>
+        </p:txBody>
+      </p:sp>
+    </p:spTree>
+    <p:extLst>
+      <p:ext uri="{BB962C8B-B14F-4D97-AF65-F5344CB8AC3E}">
+        <p14:creationId xmlns:p14="http://schemas.microsoft.com/office/powerpoint/2010/main" val="2414125523"/>
+      </p:ext>
+    </p:extLst>
+  </p:cSld>
+  <p:clrMapOvr>
+    <a:masterClrMapping/>
+  </p:clrMapOvr>
+</p:sld>
+</file>
+
+<file path=ppt/slides/slide11.xml><?xml version="1.0" encoding="utf-8"?>
+<p:sld xmlns:a="http://schemas.openxmlformats.org/drawingml/2006/main" xmlns:r="http://schemas.openxmlformats.org/officeDocument/2006/relationships" xmlns:p="http://schemas.openxmlformats.org/presentationml/2006/main">
+  <p:cSld>
+    <p:bg>
+      <p:bgPr>
+        <a:solidFill>
+          <a:schemeClr val="bg1"/>
+        </a:solidFill>
+        <a:effectLst/>
+      </p:bgPr>
+    </p:bg>
+    <p:spTree>
+      <p:nvGrpSpPr>
+        <p:cNvPr id="1" name=""/>
+        <p:cNvGrpSpPr/>
+        <p:nvPr/>
+      </p:nvGrpSpPr>
+      <p:grpSpPr>
+        <a:xfrm>
+          <a:off x="0" y="0"/>
+          <a:ext cx="0" cy="0"/>
+          <a:chOff x="0" y="0"/>
+          <a:chExt cx="0" cy="0"/>
+        </a:xfrm>
+      </p:grpSpPr>
+      <p:sp>
+        <p:nvSpPr>
+          <p:cNvPr id="10" name="Rectangle 9">
+            <a:extLst>
+              <a:ext uri="{FF2B5EF4-FFF2-40B4-BE49-F238E27FC236}">
+                <a16:creationId xmlns:a16="http://schemas.microsoft.com/office/drawing/2014/main" id="{86FF76B9-219D-4469-AF87-0236D29032F1}"/>
+              </a:ext>
+              <a:ext uri="{C183D7F6-B498-43B3-948B-1728B52AA6E4}">
+                <adec:decorative xmlns:adec="http://schemas.microsoft.com/office/drawing/2017/decorative" val="1"/>
+              </a:ext>
+            </a:extLst>
+          </p:cNvPr>
+          <p:cNvSpPr>
+            <a:spLocks noGrp="1" noRot="1" noChangeAspect="1" noMove="1" noResize="1" noEditPoints="1" noAdjustHandles="1" noChangeArrowheads="1" noChangeShapeType="1" noTextEdit="1"/>
+          </p:cNvSpPr>
+          <p:nvPr>
+            <p:extLst>
+              <p:ext uri="{386F3935-93C4-4BCD-93E2-E3B085C9AB24}">
+                <p16:designElem xmlns:p16="http://schemas.microsoft.com/office/powerpoint/2015/main" val="1"/>
+              </p:ext>
+            </p:extLst>
+          </p:nvPr>
+        </p:nvSpPr>
+        <p:spPr>
+          <a:xfrm>
+            <a:off x="0" y="0"/>
+            <a:ext cx="12192000" cy="6858000"/>
+          </a:xfrm>
+          <a:prstGeom prst="rect">
+            <a:avLst/>
+          </a:prstGeom>
+          <a:solidFill>
+            <a:schemeClr val="bg1"/>
+          </a:solidFill>
+          <a:ln>
+            <a:noFill/>
+          </a:ln>
+        </p:spPr>
+        <p:style>
+          <a:lnRef idx="2">
+            <a:schemeClr val="accent1">
+              <a:shade val="50000"/>
+            </a:schemeClr>
+          </a:lnRef>
+          <a:fillRef idx="1">
+            <a:schemeClr val="accent1"/>
+          </a:fillRef>
+          <a:effectRef idx="0">
+            <a:schemeClr val="accent1"/>
+          </a:effectRef>
+          <a:fontRef idx="minor">
+            <a:schemeClr val="lt1"/>
+          </a:fontRef>
+        </p:style>
+        <p:txBody>
+          <a:bodyPr rtlCol="0" anchor="ctr"/>
+          <a:lstStyle/>
+          <a:p>
+            <a:pPr algn="ctr"/>
+            <a:endParaRPr lang="en-US" dirty="0"/>
+          </a:p>
+        </p:txBody>
+      </p:sp>
+      <p:grpSp>
+        <p:nvGrpSpPr>
+          <p:cNvPr id="12" name="Group 11">
+            <a:extLst>
+              <a:ext uri="{FF2B5EF4-FFF2-40B4-BE49-F238E27FC236}">
+                <a16:creationId xmlns:a16="http://schemas.microsoft.com/office/drawing/2014/main" id="{DB88BD78-87E1-424D-B479-C37D8E41B12E}"/>
+              </a:ext>
+              <a:ext uri="{C183D7F6-B498-43B3-948B-1728B52AA6E4}">
+                <adec:decorative xmlns:adec="http://schemas.microsoft.com/office/drawing/2017/decorative" val="1"/>
+              </a:ext>
+            </a:extLst>
+          </p:cNvPr>
+          <p:cNvGrpSpPr>
+            <a:grpSpLocks noGrp="1" noUngrp="1" noRot="1" noChangeAspect="1" noMove="1" noResize="1"/>
+          </p:cNvGrpSpPr>
+          <p:nvPr>
+            <p:extLst>
+              <p:ext uri="{386F3935-93C4-4BCD-93E2-E3B085C9AB24}">
+                <p16:designElem xmlns:p16="http://schemas.microsoft.com/office/powerpoint/2015/main" val="1"/>
+              </p:ext>
+            </p:extLst>
+          </p:nvPr>
+        </p:nvGrpSpPr>
+        <p:grpSpPr>
+          <a:xfrm flipH="1">
+            <a:off x="10964637" y="2358"/>
+            <a:ext cx="1876653" cy="1766008"/>
+            <a:chOff x="-648769" y="2358"/>
+            <a:chExt cx="1876653" cy="1766008"/>
+          </a:xfrm>
+        </p:grpSpPr>
+        <p:sp>
+          <p:nvSpPr>
+            <p:cNvPr id="13" name="Freeform: Shape 12">
+              <a:extLst>
+                <a:ext uri="{FF2B5EF4-FFF2-40B4-BE49-F238E27FC236}">
+                  <a16:creationId xmlns:a16="http://schemas.microsoft.com/office/drawing/2014/main" id="{C05EB894-9410-4B20-95E4-7A25101AB895}"/>
+                </a:ext>
+                <a:ext uri="{C183D7F6-B498-43B3-948B-1728B52AA6E4}">
+                  <adec:decorative xmlns:adec="http://schemas.microsoft.com/office/drawing/2017/decorative" val="1"/>
+                </a:ext>
+              </a:extLst>
+            </p:cNvPr>
+            <p:cNvSpPr/>
+            <p:nvPr>
+              <p:extLst>
+                <p:ext uri="{386F3935-93C4-4BCD-93E2-E3B085C9AB24}">
+                  <p16:designElem xmlns:p16="http://schemas.microsoft.com/office/powerpoint/2015/main" val="1"/>
+                </p:ext>
+              </p:extLst>
+            </p:nvPr>
+          </p:nvSpPr>
+          <p:spPr>
+            <a:xfrm rot="2700000">
+              <a:off x="-415188" y="-231223"/>
+              <a:ext cx="1409491" cy="1876653"/>
+            </a:xfrm>
+            <a:custGeom>
+              <a:avLst/>
+              <a:gdLst>
+                <a:gd name="connsiteX0" fmla="*/ 0 w 1409491"/>
+                <a:gd name="connsiteY0" fmla="*/ 643075 h 1876653"/>
+                <a:gd name="connsiteX1" fmla="*/ 643075 w 1409491"/>
+                <a:gd name="connsiteY1" fmla="*/ 0 h 1876653"/>
+                <a:gd name="connsiteX2" fmla="*/ 1409491 w 1409491"/>
+                <a:gd name="connsiteY2" fmla="*/ 0 h 1876653"/>
+                <a:gd name="connsiteX3" fmla="*/ 1409491 w 1409491"/>
+                <a:gd name="connsiteY3" fmla="*/ 1876653 h 1876653"/>
+                <a:gd name="connsiteX4" fmla="*/ 1233578 w 1409491"/>
+                <a:gd name="connsiteY4" fmla="*/ 1876653 h 1876653"/>
+              </a:gdLst>
+              <a:ahLst/>
+              <a:cxnLst>
+                <a:cxn ang="0">
+                  <a:pos x="connsiteX0" y="connsiteY0"/>
+                </a:cxn>
+                <a:cxn ang="0">
+                  <a:pos x="connsiteX1" y="connsiteY1"/>
+                </a:cxn>
+                <a:cxn ang="0">
+                  <a:pos x="connsiteX2" y="connsiteY2"/>
+                </a:cxn>
+                <a:cxn ang="0">
+                  <a:pos x="connsiteX3" y="connsiteY3"/>
+                </a:cxn>
+                <a:cxn ang="0">
+                  <a:pos x="connsiteX4" y="connsiteY4"/>
+                </a:cxn>
+              </a:cxnLst>
+              <a:rect l="l" t="t" r="r" b="b"/>
+              <a:pathLst>
+                <a:path w="1409491" h="1876653">
+                  <a:moveTo>
+                    <a:pt x="0" y="643075"/>
+                  </a:moveTo>
+                  <a:lnTo>
+                    <a:pt x="643075" y="0"/>
+                  </a:lnTo>
+                  <a:lnTo>
+                    <a:pt x="1409491" y="0"/>
+                  </a:lnTo>
+                  <a:lnTo>
+                    <a:pt x="1409491" y="1876653"/>
+                  </a:lnTo>
+                  <a:lnTo>
+                    <a:pt x="1233578" y="1876653"/>
+                  </a:lnTo>
+                  <a:close/>
+                </a:path>
+              </a:pathLst>
+            </a:custGeom>
+            <a:solidFill>
+              <a:schemeClr val="accent1">
+                <a:alpha val="30000"/>
+              </a:schemeClr>
+            </a:solidFill>
+            <a:ln>
+              <a:noFill/>
+            </a:ln>
+          </p:spPr>
+          <p:style>
+            <a:lnRef idx="2">
+              <a:schemeClr val="accent1">
+                <a:shade val="50000"/>
+              </a:schemeClr>
+            </a:lnRef>
+            <a:fillRef idx="1">
+              <a:schemeClr val="accent1"/>
+            </a:fillRef>
+            <a:effectRef idx="0">
+              <a:schemeClr val="accent1"/>
+            </a:effectRef>
+            <a:fontRef idx="minor">
+              <a:schemeClr val="lt1"/>
+            </a:fontRef>
+          </p:style>
+          <p:txBody>
+            <a:bodyPr rtlCol="0" anchor="ctr"/>
+            <a:lstStyle/>
+            <a:p>
+              <a:pPr algn="ctr"/>
+              <a:endParaRPr lang="en-US"/>
+            </a:p>
+          </p:txBody>
+        </p:sp>
+        <p:sp>
+          <p:nvSpPr>
+            <p:cNvPr id="14" name="Rectangle 13">
+              <a:extLst>
+                <a:ext uri="{FF2B5EF4-FFF2-40B4-BE49-F238E27FC236}">
+                  <a16:creationId xmlns:a16="http://schemas.microsoft.com/office/drawing/2014/main" id="{166E38B6-B050-4340-8E8F-3A971DADC031}"/>
+                </a:ext>
+                <a:ext uri="{C183D7F6-B498-43B3-948B-1728B52AA6E4}">
+                  <adec:decorative xmlns:adec="http://schemas.microsoft.com/office/drawing/2017/decorative" val="1"/>
+                </a:ext>
+              </a:extLst>
+            </p:cNvPr>
+            <p:cNvSpPr/>
+            <p:nvPr>
+              <p:extLst>
+                <p:ext uri="{386F3935-93C4-4BCD-93E2-E3B085C9AB24}">
+                  <p16:designElem xmlns:p16="http://schemas.microsoft.com/office/powerpoint/2015/main" val="1"/>
+                </p:ext>
+              </p:extLst>
+            </p:nvPr>
+          </p:nvSpPr>
+          <p:spPr>
+            <a:xfrm rot="2700000">
+              <a:off x="301285" y="1282788"/>
+              <a:ext cx="485578" cy="485578"/>
+            </a:xfrm>
+            <a:prstGeom prst="rect">
+              <a:avLst/>
+            </a:prstGeom>
+            <a:solidFill>
+              <a:schemeClr val="accent1">
+                <a:alpha val="30000"/>
+              </a:schemeClr>
+            </a:solidFill>
+            <a:ln>
+              <a:noFill/>
+            </a:ln>
+          </p:spPr>
+          <p:style>
+            <a:lnRef idx="2">
+              <a:schemeClr val="accent1">
+                <a:shade val="50000"/>
+              </a:schemeClr>
+            </a:lnRef>
+            <a:fillRef idx="1">
+              <a:schemeClr val="accent1"/>
+            </a:fillRef>
+            <a:effectRef idx="0">
+              <a:schemeClr val="accent1"/>
+            </a:effectRef>
+            <a:fontRef idx="minor">
+              <a:schemeClr val="lt1"/>
+            </a:fontRef>
+          </p:style>
+          <p:txBody>
+            <a:bodyPr rtlCol="0" anchor="ctr"/>
+            <a:lstStyle/>
+            <a:p>
+              <a:pPr algn="ctr"/>
+              <a:endParaRPr lang="en-US"/>
+            </a:p>
+          </p:txBody>
+        </p:sp>
+      </p:grpSp>
+      <p:sp>
+        <p:nvSpPr>
+          <p:cNvPr id="16" name="Rectangle 15">
+            <a:extLst>
+              <a:ext uri="{FF2B5EF4-FFF2-40B4-BE49-F238E27FC236}">
+                <a16:creationId xmlns:a16="http://schemas.microsoft.com/office/drawing/2014/main" id="{2E80C965-DB6D-4F81-9E9E-B027384D0BD6}"/>
+              </a:ext>
+              <a:ext uri="{C183D7F6-B498-43B3-948B-1728B52AA6E4}">
+                <adec:decorative xmlns:adec="http://schemas.microsoft.com/office/drawing/2017/decorative" val="1"/>
+              </a:ext>
+            </a:extLst>
+          </p:cNvPr>
+          <p:cNvSpPr>
+            <a:spLocks noGrp="1" noRot="1" noChangeAspect="1" noMove="1" noResize="1" noEditPoints="1" noAdjustHandles="1" noChangeArrowheads="1" noChangeShapeType="1" noTextEdit="1"/>
+          </p:cNvSpPr>
+          <p:nvPr>
+            <p:extLst>
+              <p:ext uri="{386F3935-93C4-4BCD-93E2-E3B085C9AB24}">
+                <p16:designElem xmlns:p16="http://schemas.microsoft.com/office/powerpoint/2015/main" val="1"/>
+              </p:ext>
+            </p:extLst>
+          </p:nvPr>
+        </p:nvSpPr>
+        <p:spPr>
+          <a:xfrm rot="2700000">
+            <a:off x="2737196" y="6033666"/>
+            <a:ext cx="645368" cy="645368"/>
+          </a:xfrm>
+          <a:prstGeom prst="rect">
+            <a:avLst/>
+          </a:prstGeom>
+          <a:solidFill>
+            <a:schemeClr val="accent4">
+              <a:alpha val="30000"/>
+            </a:schemeClr>
+          </a:solidFill>
+          <a:ln>
+            <a:noFill/>
+          </a:ln>
+        </p:spPr>
+        <p:style>
+          <a:lnRef idx="2">
+            <a:schemeClr val="accent1">
+              <a:shade val="50000"/>
+            </a:schemeClr>
+          </a:lnRef>
+          <a:fillRef idx="1">
+            <a:schemeClr val="accent1"/>
+          </a:fillRef>
+          <a:effectRef idx="0">
+            <a:schemeClr val="accent1"/>
+          </a:effectRef>
+          <a:fontRef idx="minor">
+            <a:schemeClr val="lt1"/>
+          </a:fontRef>
+        </p:style>
+        <p:txBody>
+          <a:bodyPr rtlCol="0" anchor="ctr"/>
+          <a:lstStyle/>
+          <a:p>
+            <a:pPr algn="ctr"/>
+            <a:endParaRPr lang="en-US"/>
+          </a:p>
+        </p:txBody>
+      </p:sp>
+      <p:sp>
+        <p:nvSpPr>
+          <p:cNvPr id="18" name="Isosceles Triangle 17">
+            <a:extLst>
+              <a:ext uri="{FF2B5EF4-FFF2-40B4-BE49-F238E27FC236}">
+                <a16:creationId xmlns:a16="http://schemas.microsoft.com/office/drawing/2014/main" id="{633C5E46-DAC5-4661-9C87-22B08E2A512F}"/>
+              </a:ext>
+              <a:ext uri="{C183D7F6-B498-43B3-948B-1728B52AA6E4}">
+                <adec:decorative xmlns:adec="http://schemas.microsoft.com/office/drawing/2017/decorative" val="1"/>
+              </a:ext>
+            </a:extLst>
+          </p:cNvPr>
+          <p:cNvSpPr>
+            <a:spLocks noGrp="1" noRot="1" noChangeAspect="1" noMove="1" noResize="1" noEditPoints="1" noAdjustHandles="1" noChangeArrowheads="1" noChangeShapeType="1" noTextEdit="1"/>
+          </p:cNvSpPr>
+          <p:nvPr>
+            <p:extLst>
+              <p:ext uri="{386F3935-93C4-4BCD-93E2-E3B085C9AB24}">
+                <p16:designElem xmlns:p16="http://schemas.microsoft.com/office/powerpoint/2015/main" val="1"/>
+              </p:ext>
+            </p:extLst>
+          </p:nvPr>
+        </p:nvSpPr>
+        <p:spPr>
+          <a:xfrm>
+            <a:off x="1343436" y="5721108"/>
+            <a:ext cx="2261965" cy="1136891"/>
+          </a:xfrm>
+          <a:prstGeom prst="triangle">
+            <a:avLst>
+              <a:gd name="adj" fmla="val 50000"/>
+            </a:avLst>
+          </a:prstGeom>
+          <a:solidFill>
+            <a:schemeClr val="accent4">
+              <a:alpha val="30000"/>
+            </a:schemeClr>
+          </a:solidFill>
+          <a:ln>
+            <a:noFill/>
+          </a:ln>
+        </p:spPr>
+        <p:style>
+          <a:lnRef idx="2">
+            <a:schemeClr val="accent1">
+              <a:shade val="50000"/>
+            </a:schemeClr>
+          </a:lnRef>
+          <a:fillRef idx="1">
+            <a:schemeClr val="accent1"/>
+          </a:fillRef>
+          <a:effectRef idx="0">
+            <a:schemeClr val="accent1"/>
+          </a:effectRef>
+          <a:fontRef idx="minor">
+            <a:schemeClr val="lt1"/>
+          </a:fontRef>
+        </p:style>
+        <p:txBody>
+          <a:bodyPr rtlCol="0" anchor="ctr"/>
+          <a:lstStyle/>
+          <a:p>
+            <a:pPr algn="ctr"/>
+            <a:endParaRPr lang="en-US"/>
+          </a:p>
+        </p:txBody>
+      </p:sp>
+      <p:graphicFrame>
+        <p:nvGraphicFramePr>
+          <p:cNvPr id="5" name="Table 5">
+            <a:extLst>
+              <a:ext uri="{FF2B5EF4-FFF2-40B4-BE49-F238E27FC236}">
+                <a16:creationId xmlns:a16="http://schemas.microsoft.com/office/drawing/2014/main" id="{BF6FBA63-94FB-051F-3291-CCEC9DC1BFA4}"/>
+              </a:ext>
+            </a:extLst>
+          </p:cNvPr>
+          <p:cNvGraphicFramePr>
+            <a:graphicFrameLocks noGrp="1"/>
+          </p:cNvGraphicFramePr>
+          <p:nvPr>
+            <p:extLst>
+              <p:ext uri="{D42A27DB-BD31-4B8C-83A1-F6EECF244321}">
+                <p14:modId xmlns:p14="http://schemas.microsoft.com/office/powerpoint/2010/main" val="2772968872"/>
+              </p:ext>
+            </p:extLst>
+          </p:nvPr>
+        </p:nvGraphicFramePr>
+        <p:xfrm>
+          <a:off x="2107565" y="1953767"/>
+          <a:ext cx="7976871" cy="2950464"/>
+        </p:xfrm>
+        <a:graphic>
+          <a:graphicData uri="http://schemas.openxmlformats.org/drawingml/2006/table">
+            <a:tbl>
+              <a:tblPr firstRow="1" bandRow="1">
+                <a:tableStyleId>{5C22544A-7EE6-4342-B048-85BDC9FD1C3A}</a:tableStyleId>
+              </a:tblPr>
+              <a:tblGrid>
+                <a:gridCol w="5792894">
+                  <a:extLst>
+                    <a:ext uri="{9D8B030D-6E8A-4147-A177-3AD203B41FA5}">
+                      <a16:colId xmlns:a16="http://schemas.microsoft.com/office/drawing/2014/main" val="1310152373"/>
+                    </a:ext>
+                  </a:extLst>
+                </a:gridCol>
+                <a:gridCol w="2183977">
+                  <a:extLst>
+                    <a:ext uri="{9D8B030D-6E8A-4147-A177-3AD203B41FA5}">
+                      <a16:colId xmlns:a16="http://schemas.microsoft.com/office/drawing/2014/main" val="3602471781"/>
+                    </a:ext>
+                  </a:extLst>
+                </a:gridCol>
+              </a:tblGrid>
+              <a:tr h="737616">
+                <a:tc>
+                  <a:txBody>
+                    <a:bodyPr/>
+                    <a:lstStyle/>
+                    <a:p>
+                      <a:r>
+                        <a:rPr lang="en-US" sz="3300"/>
+                        <a:t>Total number of observation</a:t>
+                      </a:r>
+                      <a:endParaRPr lang="en-KE" sz="3300"/>
+                    </a:p>
+                  </a:txBody>
+                  <a:tcPr marL="167640" marR="167640" marT="83820" marB="83820"/>
+                </a:tc>
+                <a:tc>
+                  <a:txBody>
+                    <a:bodyPr/>
+                    <a:lstStyle/>
+                    <a:p>
+                      <a:r>
+                        <a:rPr lang="en-US" sz="3300"/>
+                        <a:t>440098</a:t>
+                      </a:r>
+                      <a:endParaRPr lang="en-KE" sz="3300"/>
+                    </a:p>
+                  </a:txBody>
+                  <a:tcPr marL="167640" marR="167640" marT="83820" marB="83820"/>
+                </a:tc>
+                <a:extLst>
+                  <a:ext uri="{0D108BD9-81ED-4DB2-BD59-A6C34878D82A}">
+                    <a16:rowId xmlns:a16="http://schemas.microsoft.com/office/drawing/2014/main" val="258419646"/>
+                  </a:ext>
+                </a:extLst>
+              </a:tr>
+              <a:tr h="737616">
+                <a:tc>
+                  <a:txBody>
+                    <a:bodyPr/>
+                    <a:lstStyle/>
+                    <a:p>
+                      <a:r>
+                        <a:rPr lang="en-US" sz="3300"/>
+                        <a:t>Total number of features</a:t>
+                      </a:r>
+                      <a:endParaRPr lang="en-KE" sz="3300"/>
+                    </a:p>
+                  </a:txBody>
+                  <a:tcPr marL="167640" marR="167640" marT="83820" marB="83820"/>
+                </a:tc>
+                <a:tc>
+                  <a:txBody>
+                    <a:bodyPr/>
+                    <a:lstStyle/>
+                    <a:p>
+                      <a:r>
+                        <a:rPr lang="en-US" sz="3300"/>
+                        <a:t>3</a:t>
+                      </a:r>
+                      <a:endParaRPr lang="en-KE" sz="3300"/>
+                    </a:p>
+                  </a:txBody>
+                  <a:tcPr marL="167640" marR="167640" marT="83820" marB="83820"/>
+                </a:tc>
+                <a:extLst>
+                  <a:ext uri="{0D108BD9-81ED-4DB2-BD59-A6C34878D82A}">
+                    <a16:rowId xmlns:a16="http://schemas.microsoft.com/office/drawing/2014/main" val="925194469"/>
+                  </a:ext>
+                </a:extLst>
+              </a:tr>
+              <a:tr h="737616">
+                <a:tc>
+                  <a:txBody>
+                    <a:bodyPr/>
+                    <a:lstStyle/>
+                    <a:p>
+                      <a:r>
+                        <a:rPr lang="en-US" sz="3300"/>
+                        <a:t>Base format of the file</a:t>
+                      </a:r>
+                      <a:endParaRPr lang="en-KE" sz="3300"/>
+                    </a:p>
+                  </a:txBody>
+                  <a:tcPr marL="167640" marR="167640" marT="83820" marB="83820"/>
+                </a:tc>
+                <a:tc>
+                  <a:txBody>
+                    <a:bodyPr/>
+                    <a:lstStyle/>
+                    <a:p>
+                      <a:r>
+                        <a:rPr lang="en-US" sz="3300"/>
+                        <a:t>.csv</a:t>
+                      </a:r>
+                      <a:endParaRPr lang="en-KE" sz="3300"/>
+                    </a:p>
+                  </a:txBody>
+                  <a:tcPr marL="167640" marR="167640" marT="83820" marB="83820"/>
+                </a:tc>
+                <a:extLst>
+                  <a:ext uri="{0D108BD9-81ED-4DB2-BD59-A6C34878D82A}">
+                    <a16:rowId xmlns:a16="http://schemas.microsoft.com/office/drawing/2014/main" val="3384269822"/>
+                  </a:ext>
+                </a:extLst>
+              </a:tr>
+              <a:tr h="737616">
+                <a:tc>
+                  <a:txBody>
+                    <a:bodyPr/>
+                    <a:lstStyle/>
+                    <a:p>
+                      <a:r>
+                        <a:rPr lang="en-US" sz="3300"/>
+                        <a:t>Size of the data</a:t>
+                      </a:r>
+                      <a:endParaRPr lang="en-KE" sz="3300"/>
+                    </a:p>
+                  </a:txBody>
+                  <a:tcPr marL="167640" marR="167640" marT="83820" marB="83820"/>
+                </a:tc>
+                <a:tc>
+                  <a:txBody>
+                    <a:bodyPr/>
+                    <a:lstStyle/>
+                    <a:p>
+                      <a:r>
+                        <a:rPr lang="en-US" sz="3300"/>
+                        <a:t>8788 KB</a:t>
+                      </a:r>
+                      <a:endParaRPr lang="en-KE" sz="3300"/>
+                    </a:p>
+                  </a:txBody>
+                  <a:tcPr marL="167640" marR="167640" marT="83820" marB="83820"/>
+                </a:tc>
+                <a:extLst>
+                  <a:ext uri="{0D108BD9-81ED-4DB2-BD59-A6C34878D82A}">
+                    <a16:rowId xmlns:a16="http://schemas.microsoft.com/office/drawing/2014/main" val="2003230526"/>
+                  </a:ext>
+                </a:extLst>
+              </a:tr>
+            </a:tbl>
+          </a:graphicData>
+        </a:graphic>
+      </p:graphicFrame>
+    </p:spTree>
+    <p:extLst>
+      <p:ext uri="{BB962C8B-B14F-4D97-AF65-F5344CB8AC3E}">
+        <p14:creationId xmlns:p14="http://schemas.microsoft.com/office/powerpoint/2010/main" val="3025197475"/>
+      </p:ext>
+    </p:extLst>
+  </p:cSld>
+  <p:clrMapOvr>
+    <a:masterClrMapping/>
+  </p:clrMapOvr>
+</p:sld>
+</file>
+
+<file path=ppt/slides/slide12.xml><?xml version="1.0" encoding="utf-8"?>
+<p:sld xmlns:a="http://schemas.openxmlformats.org/drawingml/2006/main" xmlns:r="http://schemas.openxmlformats.org/officeDocument/2006/relationships" xmlns:p="http://schemas.openxmlformats.org/presentationml/2006/main">
+  <p:cSld>
+    <p:bg>
+      <p:bgPr>
+        <a:solidFill>
+          <a:schemeClr val="bg1"/>
+        </a:solidFill>
+        <a:effectLst/>
+      </p:bgPr>
+    </p:bg>
+    <p:spTree>
+      <p:nvGrpSpPr>
+        <p:cNvPr id="1" name=""/>
+        <p:cNvGrpSpPr/>
+        <p:nvPr/>
+      </p:nvGrpSpPr>
+      <p:grpSpPr>
+        <a:xfrm>
+          <a:off x="0" y="0"/>
+          <a:ext cx="0" cy="0"/>
+          <a:chOff x="0" y="0"/>
+          <a:chExt cx="0" cy="0"/>
+        </a:xfrm>
+      </p:grpSpPr>
+      <p:sp>
+        <p:nvSpPr>
+          <p:cNvPr id="21" name="Down Arrow 7">
+            <a:extLst>
+              <a:ext uri="{FF2B5EF4-FFF2-40B4-BE49-F238E27FC236}">
+                <a16:creationId xmlns:a16="http://schemas.microsoft.com/office/drawing/2014/main" id="{D4771268-CB57-404A-9271-370EB28F6090}"/>
+              </a:ext>
+              <a:ext uri="{C183D7F6-B498-43B3-948B-1728B52AA6E4}">
+                <adec:decorative xmlns:adec="http://schemas.microsoft.com/office/drawing/2017/decorative" val="1"/>
+              </a:ext>
+            </a:extLst>
+          </p:cNvPr>
+          <p:cNvSpPr>
+            <a:spLocks noGrp="1" noRot="1" noChangeAspect="1" noMove="1" noResize="1" noEditPoints="1" noAdjustHandles="1" noChangeArrowheads="1" noChangeShapeType="1" noTextEdit="1"/>
+          </p:cNvSpPr>
+          <p:nvPr>
+            <p:extLst>
+              <p:ext uri="{386F3935-93C4-4BCD-93E2-E3B085C9AB24}">
+                <p16:designElem xmlns:p16="http://schemas.microsoft.com/office/powerpoint/2015/main" val="1"/>
+              </p:ext>
+            </p:extLst>
+          </p:nvPr>
+        </p:nvSpPr>
+        <p:spPr>
+          <a:xfrm rot="16200000">
+            <a:off x="800100" y="1491343"/>
+            <a:ext cx="3333749" cy="3499103"/>
+          </a:xfrm>
+          <a:prstGeom prst="downArrow">
+            <a:avLst>
+              <a:gd name="adj1" fmla="val 100000"/>
+              <a:gd name="adj2" fmla="val 15788"/>
+            </a:avLst>
+          </a:prstGeom>
+          <a:solidFill>
+            <a:srgbClr val="404040"/>
+          </a:solidFill>
+          <a:ln w="53975">
+            <a:noFill/>
+          </a:ln>
+        </p:spPr>
+        <p:style>
+          <a:lnRef idx="2">
+            <a:schemeClr val="accent1">
+              <a:shade val="50000"/>
+            </a:schemeClr>
+          </a:lnRef>
+          <a:fillRef idx="1">
+            <a:schemeClr val="accent1"/>
+          </a:fillRef>
+          <a:effectRef idx="0">
+            <a:schemeClr val="accent1"/>
+          </a:effectRef>
+          <a:fontRef idx="minor">
+            <a:schemeClr val="lt1"/>
+          </a:fontRef>
+        </p:style>
+        <p:txBody>
+          <a:bodyPr rtlCol="0" anchor="ctr"/>
+          <a:lstStyle/>
+          <a:p>
+            <a:pPr algn="ctr"/>
+            <a:endParaRPr lang="en-US"/>
+          </a:p>
+        </p:txBody>
+      </p:sp>
+      <p:sp>
+        <p:nvSpPr>
+          <p:cNvPr id="2" name="Title 1">
+            <a:extLst>
+              <a:ext uri="{FF2B5EF4-FFF2-40B4-BE49-F238E27FC236}">
+                <a16:creationId xmlns:a16="http://schemas.microsoft.com/office/drawing/2014/main" id="{66B80612-D09B-CEB2-39BB-22AAB735A30A}"/>
+              </a:ext>
+            </a:extLst>
+          </p:cNvPr>
+          <p:cNvSpPr>
+            <a:spLocks noGrp="1"/>
+          </p:cNvSpPr>
+          <p:nvPr>
+            <p:ph type="title"/>
+          </p:nvPr>
+        </p:nvSpPr>
+        <p:spPr>
+          <a:xfrm>
+            <a:off x="1028700" y="1967266"/>
+            <a:ext cx="2628900" cy="2547257"/>
+          </a:xfrm>
+          <a:noFill/>
+        </p:spPr>
+        <p:txBody>
+          <a:bodyPr vert="horz" lIns="91440" tIns="45720" rIns="91440" bIns="45720" rtlCol="0" anchor="ctr">
+            <a:normAutofit/>
+          </a:bodyPr>
+          <a:lstStyle/>
+          <a:p>
+            <a:pPr algn="ctr"/>
+            <a:r>
+              <a:rPr lang="en-US" sz="3600" kern="1200" dirty="0">
+                <a:solidFill>
+                  <a:srgbClr val="FFFFFF"/>
+                </a:solidFill>
+                <a:latin typeface="+mj-lt"/>
+                <a:ea typeface="+mj-ea"/>
+                <a:cs typeface="+mj-cs"/>
+              </a:rPr>
+              <a:t>Preferred Payment mode</a:t>
+            </a:r>
+          </a:p>
+        </p:txBody>
+      </p:sp>
+      <p:pic>
+        <p:nvPicPr>
+          <p:cNvPr id="6" name="Content Placeholder 5" descr="A green bar graph with white text&#10;&#10;Description automatically generated">
+            <a:extLst>
+              <a:ext uri="{FF2B5EF4-FFF2-40B4-BE49-F238E27FC236}">
+                <a16:creationId xmlns:a16="http://schemas.microsoft.com/office/drawing/2014/main" id="{1053CF8D-4D7D-181B-73D9-9AEAD633F174}"/>
+              </a:ext>
+            </a:extLst>
+          </p:cNvPr>
+          <p:cNvPicPr>
+            <a:picLocks noGrp="1" noChangeAspect="1"/>
+          </p:cNvPicPr>
+          <p:nvPr>
+            <p:ph idx="1"/>
+          </p:nvPr>
+        </p:nvPicPr>
+        <p:blipFill>
+          <a:blip r:embed="rId2">
+            <a:extLst>
+              <a:ext uri="{28A0092B-C50C-407E-A947-70E740481C1C}">
+                <a14:useLocalDpi xmlns:a14="http://schemas.microsoft.com/office/drawing/2010/main" val="0"/>
+              </a:ext>
+            </a:extLst>
+          </a:blip>
+          <a:stretch>
+            <a:fillRect/>
+          </a:stretch>
+        </p:blipFill>
+        <p:spPr>
+          <a:xfrm>
+            <a:off x="4782415" y="643466"/>
+            <a:ext cx="6770502" cy="5568739"/>
+          </a:xfrm>
+          <a:prstGeom prst="rect">
+            <a:avLst/>
+          </a:prstGeom>
+        </p:spPr>
+      </p:pic>
+    </p:spTree>
+    <p:extLst>
+      <p:ext uri="{BB962C8B-B14F-4D97-AF65-F5344CB8AC3E}">
+        <p14:creationId xmlns:p14="http://schemas.microsoft.com/office/powerpoint/2010/main" val="2859396079"/>
+      </p:ext>
+    </p:extLst>
+  </p:cSld>
+  <p:clrMapOvr>
+    <a:masterClrMapping/>
+  </p:clrMapOvr>
+</p:sld>
+</file>
+
+<file path=ppt/slides/slide13.xml><?xml version="1.0" encoding="utf-8"?>
+<p:sld xmlns:a="http://schemas.openxmlformats.org/drawingml/2006/main" xmlns:r="http://schemas.openxmlformats.org/officeDocument/2006/relationships" xmlns:p="http://schemas.openxmlformats.org/presentationml/2006/main">
+  <p:cSld>
+    <p:bg>
+      <p:bgPr>
+        <a:solidFill>
+          <a:schemeClr val="bg1"/>
+        </a:solidFill>
+        <a:effectLst/>
+      </p:bgPr>
+    </p:bg>
+    <p:spTree>
+      <p:nvGrpSpPr>
+        <p:cNvPr id="1" name=""/>
+        <p:cNvGrpSpPr/>
+        <p:nvPr/>
+      </p:nvGrpSpPr>
+      <p:grpSpPr>
+        <a:xfrm>
+          <a:off x="0" y="0"/>
+          <a:ext cx="0" cy="0"/>
+          <a:chOff x="0" y="0"/>
+          <a:chExt cx="0" cy="0"/>
+        </a:xfrm>
+      </p:grpSpPr>
+      <p:sp>
+        <p:nvSpPr>
+          <p:cNvPr id="10" name="Rectangle 9">
+            <a:extLst>
+              <a:ext uri="{FF2B5EF4-FFF2-40B4-BE49-F238E27FC236}">
+                <a16:creationId xmlns:a16="http://schemas.microsoft.com/office/drawing/2014/main" id="{86FF76B9-219D-4469-AF87-0236D29032F1}"/>
+              </a:ext>
+              <a:ext uri="{C183D7F6-B498-43B3-948B-1728B52AA6E4}">
+                <adec:decorative xmlns:adec="http://schemas.microsoft.com/office/drawing/2017/decorative" val="1"/>
+              </a:ext>
+            </a:extLst>
+          </p:cNvPr>
+          <p:cNvSpPr>
+            <a:spLocks noGrp="1" noRot="1" noChangeAspect="1" noMove="1" noResize="1" noEditPoints="1" noAdjustHandles="1" noChangeArrowheads="1" noChangeShapeType="1" noTextEdit="1"/>
+          </p:cNvSpPr>
+          <p:nvPr>
+            <p:extLst>
+              <p:ext uri="{386F3935-93C4-4BCD-93E2-E3B085C9AB24}">
+                <p16:designElem xmlns:p16="http://schemas.microsoft.com/office/powerpoint/2015/main" val="1"/>
+              </p:ext>
+            </p:extLst>
+          </p:nvPr>
+        </p:nvSpPr>
+        <p:spPr>
+          <a:xfrm>
+            <a:off x="0" y="0"/>
+            <a:ext cx="12192000" cy="6858000"/>
+          </a:xfrm>
+          <a:prstGeom prst="rect">
+            <a:avLst/>
+          </a:prstGeom>
+          <a:solidFill>
+            <a:schemeClr val="bg1"/>
+          </a:solidFill>
+          <a:ln>
+            <a:noFill/>
+          </a:ln>
+        </p:spPr>
+        <p:style>
+          <a:lnRef idx="2">
+            <a:schemeClr val="accent1">
+              <a:shade val="50000"/>
+            </a:schemeClr>
+          </a:lnRef>
+          <a:fillRef idx="1">
+            <a:schemeClr val="accent1"/>
+          </a:fillRef>
+          <a:effectRef idx="0">
+            <a:schemeClr val="accent1"/>
+          </a:effectRef>
+          <a:fontRef idx="minor">
+            <a:schemeClr val="lt1"/>
+          </a:fontRef>
+        </p:style>
+        <p:txBody>
+          <a:bodyPr rtlCol="0" anchor="ctr"/>
+          <a:lstStyle/>
+          <a:p>
+            <a:pPr algn="ctr"/>
+            <a:endParaRPr lang="en-US" dirty="0"/>
+          </a:p>
+        </p:txBody>
+      </p:sp>
+      <p:grpSp>
+        <p:nvGrpSpPr>
+          <p:cNvPr id="12" name="Group 11">
+            <a:extLst>
+              <a:ext uri="{FF2B5EF4-FFF2-40B4-BE49-F238E27FC236}">
+                <a16:creationId xmlns:a16="http://schemas.microsoft.com/office/drawing/2014/main" id="{DB88BD78-87E1-424D-B479-C37D8E41B12E}"/>
+              </a:ext>
+              <a:ext uri="{C183D7F6-B498-43B3-948B-1728B52AA6E4}">
+                <adec:decorative xmlns:adec="http://schemas.microsoft.com/office/drawing/2017/decorative" val="1"/>
+              </a:ext>
+            </a:extLst>
+          </p:cNvPr>
+          <p:cNvGrpSpPr>
+            <a:grpSpLocks noGrp="1" noUngrp="1" noRot="1" noChangeAspect="1" noMove="1" noResize="1"/>
+          </p:cNvGrpSpPr>
+          <p:nvPr>
+            <p:extLst>
+              <p:ext uri="{386F3935-93C4-4BCD-93E2-E3B085C9AB24}">
+                <p16:designElem xmlns:p16="http://schemas.microsoft.com/office/powerpoint/2015/main" val="1"/>
+              </p:ext>
+            </p:extLst>
+          </p:nvPr>
+        </p:nvGrpSpPr>
+        <p:grpSpPr>
+          <a:xfrm flipH="1">
+            <a:off x="10964637" y="2358"/>
+            <a:ext cx="1876653" cy="1766008"/>
+            <a:chOff x="-648769" y="2358"/>
+            <a:chExt cx="1876653" cy="1766008"/>
+          </a:xfrm>
+        </p:grpSpPr>
+        <p:sp>
+          <p:nvSpPr>
+            <p:cNvPr id="13" name="Freeform: Shape 12">
+              <a:extLst>
+                <a:ext uri="{FF2B5EF4-FFF2-40B4-BE49-F238E27FC236}">
+                  <a16:creationId xmlns:a16="http://schemas.microsoft.com/office/drawing/2014/main" id="{C05EB894-9410-4B20-95E4-7A25101AB895}"/>
+                </a:ext>
+                <a:ext uri="{C183D7F6-B498-43B3-948B-1728B52AA6E4}">
+                  <adec:decorative xmlns:adec="http://schemas.microsoft.com/office/drawing/2017/decorative" val="1"/>
+                </a:ext>
+              </a:extLst>
+            </p:cNvPr>
+            <p:cNvSpPr/>
+            <p:nvPr>
+              <p:extLst>
+                <p:ext uri="{386F3935-93C4-4BCD-93E2-E3B085C9AB24}">
+                  <p16:designElem xmlns:p16="http://schemas.microsoft.com/office/powerpoint/2015/main" val="1"/>
+                </p:ext>
+              </p:extLst>
+            </p:nvPr>
+          </p:nvSpPr>
+          <p:spPr>
+            <a:xfrm rot="2700000">
+              <a:off x="-415188" y="-231223"/>
+              <a:ext cx="1409491" cy="1876653"/>
+            </a:xfrm>
+            <a:custGeom>
+              <a:avLst/>
+              <a:gdLst>
+                <a:gd name="connsiteX0" fmla="*/ 0 w 1409491"/>
+                <a:gd name="connsiteY0" fmla="*/ 643075 h 1876653"/>
+                <a:gd name="connsiteX1" fmla="*/ 643075 w 1409491"/>
+                <a:gd name="connsiteY1" fmla="*/ 0 h 1876653"/>
+                <a:gd name="connsiteX2" fmla="*/ 1409491 w 1409491"/>
+                <a:gd name="connsiteY2" fmla="*/ 0 h 1876653"/>
+                <a:gd name="connsiteX3" fmla="*/ 1409491 w 1409491"/>
+                <a:gd name="connsiteY3" fmla="*/ 1876653 h 1876653"/>
+                <a:gd name="connsiteX4" fmla="*/ 1233578 w 1409491"/>
+                <a:gd name="connsiteY4" fmla="*/ 1876653 h 1876653"/>
+              </a:gdLst>
+              <a:ahLst/>
+              <a:cxnLst>
+                <a:cxn ang="0">
+                  <a:pos x="connsiteX0" y="connsiteY0"/>
+                </a:cxn>
+                <a:cxn ang="0">
+                  <a:pos x="connsiteX1" y="connsiteY1"/>
+                </a:cxn>
+                <a:cxn ang="0">
+                  <a:pos x="connsiteX2" y="connsiteY2"/>
+                </a:cxn>
+                <a:cxn ang="0">
+                  <a:pos x="connsiteX3" y="connsiteY3"/>
+                </a:cxn>
+                <a:cxn ang="0">
+                  <a:pos x="connsiteX4" y="connsiteY4"/>
+                </a:cxn>
+              </a:cxnLst>
+              <a:rect l="l" t="t" r="r" b="b"/>
+              <a:pathLst>
+                <a:path w="1409491" h="1876653">
+                  <a:moveTo>
+                    <a:pt x="0" y="643075"/>
+                  </a:moveTo>
+                  <a:lnTo>
+                    <a:pt x="643075" y="0"/>
+                  </a:lnTo>
+                  <a:lnTo>
+                    <a:pt x="1409491" y="0"/>
+                  </a:lnTo>
+                  <a:lnTo>
+                    <a:pt x="1409491" y="1876653"/>
+                  </a:lnTo>
+                  <a:lnTo>
+                    <a:pt x="1233578" y="1876653"/>
+                  </a:lnTo>
+                  <a:close/>
+                </a:path>
+              </a:pathLst>
+            </a:custGeom>
+            <a:solidFill>
+              <a:schemeClr val="accent1">
+                <a:alpha val="30000"/>
+              </a:schemeClr>
+            </a:solidFill>
+            <a:ln>
+              <a:noFill/>
+            </a:ln>
+          </p:spPr>
+          <p:style>
+            <a:lnRef idx="2">
+              <a:schemeClr val="accent1">
+                <a:shade val="50000"/>
+              </a:schemeClr>
+            </a:lnRef>
+            <a:fillRef idx="1">
+              <a:schemeClr val="accent1"/>
+            </a:fillRef>
+            <a:effectRef idx="0">
+              <a:schemeClr val="accent1"/>
+            </a:effectRef>
+            <a:fontRef idx="minor">
+              <a:schemeClr val="lt1"/>
+            </a:fontRef>
+          </p:style>
+          <p:txBody>
+            <a:bodyPr rtlCol="0" anchor="ctr"/>
+            <a:lstStyle/>
+            <a:p>
+              <a:pPr algn="ctr"/>
+              <a:endParaRPr lang="en-US"/>
+            </a:p>
+          </p:txBody>
+        </p:sp>
+        <p:sp>
+          <p:nvSpPr>
+            <p:cNvPr id="14" name="Rectangle 13">
+              <a:extLst>
+                <a:ext uri="{FF2B5EF4-FFF2-40B4-BE49-F238E27FC236}">
+                  <a16:creationId xmlns:a16="http://schemas.microsoft.com/office/drawing/2014/main" id="{166E38B6-B050-4340-8E8F-3A971DADC031}"/>
+                </a:ext>
+                <a:ext uri="{C183D7F6-B498-43B3-948B-1728B52AA6E4}">
+                  <adec:decorative xmlns:adec="http://schemas.microsoft.com/office/drawing/2017/decorative" val="1"/>
+                </a:ext>
+              </a:extLst>
+            </p:cNvPr>
+            <p:cNvSpPr/>
+            <p:nvPr>
+              <p:extLst>
+                <p:ext uri="{386F3935-93C4-4BCD-93E2-E3B085C9AB24}">
+                  <p16:designElem xmlns:p16="http://schemas.microsoft.com/office/powerpoint/2015/main" val="1"/>
+                </p:ext>
+              </p:extLst>
+            </p:nvPr>
+          </p:nvSpPr>
+          <p:spPr>
+            <a:xfrm rot="2700000">
+              <a:off x="301285" y="1282788"/>
+              <a:ext cx="485578" cy="485578"/>
+            </a:xfrm>
+            <a:prstGeom prst="rect">
+              <a:avLst/>
+            </a:prstGeom>
+            <a:solidFill>
+              <a:schemeClr val="accent1">
+                <a:alpha val="30000"/>
+              </a:schemeClr>
+            </a:solidFill>
+            <a:ln>
+              <a:noFill/>
+            </a:ln>
+          </p:spPr>
+          <p:style>
+            <a:lnRef idx="2">
+              <a:schemeClr val="accent1">
+                <a:shade val="50000"/>
+              </a:schemeClr>
+            </a:lnRef>
+            <a:fillRef idx="1">
+              <a:schemeClr val="accent1"/>
+            </a:fillRef>
+            <a:effectRef idx="0">
+              <a:schemeClr val="accent1"/>
+            </a:effectRef>
+            <a:fontRef idx="minor">
+              <a:schemeClr val="lt1"/>
+            </a:fontRef>
+          </p:style>
+          <p:txBody>
+            <a:bodyPr rtlCol="0" anchor="ctr"/>
+            <a:lstStyle/>
+            <a:p>
+              <a:pPr algn="ctr"/>
+              <a:endParaRPr lang="en-US"/>
+            </a:p>
+          </p:txBody>
+        </p:sp>
+      </p:grpSp>
+      <p:sp>
+        <p:nvSpPr>
+          <p:cNvPr id="16" name="Rectangle 15">
+            <a:extLst>
+              <a:ext uri="{FF2B5EF4-FFF2-40B4-BE49-F238E27FC236}">
+                <a16:creationId xmlns:a16="http://schemas.microsoft.com/office/drawing/2014/main" id="{2E80C965-DB6D-4F81-9E9E-B027384D0BD6}"/>
+              </a:ext>
+              <a:ext uri="{C183D7F6-B498-43B3-948B-1728B52AA6E4}">
+                <adec:decorative xmlns:adec="http://schemas.microsoft.com/office/drawing/2017/decorative" val="1"/>
+              </a:ext>
+            </a:extLst>
+          </p:cNvPr>
+          <p:cNvSpPr>
+            <a:spLocks noGrp="1" noRot="1" noChangeAspect="1" noMove="1" noResize="1" noEditPoints="1" noAdjustHandles="1" noChangeArrowheads="1" noChangeShapeType="1" noTextEdit="1"/>
+          </p:cNvSpPr>
+          <p:nvPr>
+            <p:extLst>
+              <p:ext uri="{386F3935-93C4-4BCD-93E2-E3B085C9AB24}">
+                <p16:designElem xmlns:p16="http://schemas.microsoft.com/office/powerpoint/2015/main" val="1"/>
+              </p:ext>
+            </p:extLst>
+          </p:nvPr>
+        </p:nvSpPr>
+        <p:spPr>
+          <a:xfrm rot="2700000">
+            <a:off x="2737196" y="6033666"/>
+            <a:ext cx="645368" cy="645368"/>
+          </a:xfrm>
+          <a:prstGeom prst="rect">
+            <a:avLst/>
+          </a:prstGeom>
+          <a:solidFill>
+            <a:schemeClr val="accent4">
+              <a:alpha val="30000"/>
+            </a:schemeClr>
+          </a:solidFill>
+          <a:ln>
+            <a:noFill/>
+          </a:ln>
+        </p:spPr>
+        <p:style>
+          <a:lnRef idx="2">
+            <a:schemeClr val="accent1">
+              <a:shade val="50000"/>
+            </a:schemeClr>
+          </a:lnRef>
+          <a:fillRef idx="1">
+            <a:schemeClr val="accent1"/>
+          </a:fillRef>
+          <a:effectRef idx="0">
+            <a:schemeClr val="accent1"/>
+          </a:effectRef>
+          <a:fontRef idx="minor">
+            <a:schemeClr val="lt1"/>
+          </a:fontRef>
+        </p:style>
+        <p:txBody>
+          <a:bodyPr rtlCol="0" anchor="ctr"/>
+          <a:lstStyle/>
+          <a:p>
+            <a:pPr algn="ctr"/>
+            <a:endParaRPr lang="en-US"/>
+          </a:p>
+        </p:txBody>
+      </p:sp>
+      <p:sp>
+        <p:nvSpPr>
+          <p:cNvPr id="18" name="Isosceles Triangle 17">
+            <a:extLst>
+              <a:ext uri="{FF2B5EF4-FFF2-40B4-BE49-F238E27FC236}">
+                <a16:creationId xmlns:a16="http://schemas.microsoft.com/office/drawing/2014/main" id="{633C5E46-DAC5-4661-9C87-22B08E2A512F}"/>
+              </a:ext>
+              <a:ext uri="{C183D7F6-B498-43B3-948B-1728B52AA6E4}">
+                <adec:decorative xmlns:adec="http://schemas.microsoft.com/office/drawing/2017/decorative" val="1"/>
+              </a:ext>
+            </a:extLst>
+          </p:cNvPr>
+          <p:cNvSpPr>
+            <a:spLocks noGrp="1" noRot="1" noChangeAspect="1" noMove="1" noResize="1" noEditPoints="1" noAdjustHandles="1" noChangeArrowheads="1" noChangeShapeType="1" noTextEdit="1"/>
+          </p:cNvSpPr>
+          <p:nvPr>
+            <p:extLst>
+              <p:ext uri="{386F3935-93C4-4BCD-93E2-E3B085C9AB24}">
+                <p16:designElem xmlns:p16="http://schemas.microsoft.com/office/powerpoint/2015/main" val="1"/>
+              </p:ext>
+            </p:extLst>
+          </p:nvPr>
+        </p:nvSpPr>
+        <p:spPr>
+          <a:xfrm>
+            <a:off x="1343436" y="5721108"/>
+            <a:ext cx="2261965" cy="1136891"/>
+          </a:xfrm>
+          <a:prstGeom prst="triangle">
+            <a:avLst>
+              <a:gd name="adj" fmla="val 50000"/>
+            </a:avLst>
+          </a:prstGeom>
+          <a:solidFill>
+            <a:schemeClr val="accent4">
+              <a:alpha val="30000"/>
+            </a:schemeClr>
+          </a:solidFill>
+          <a:ln>
+            <a:noFill/>
+          </a:ln>
+        </p:spPr>
+        <p:style>
+          <a:lnRef idx="2">
+            <a:schemeClr val="accent1">
+              <a:shade val="50000"/>
+            </a:schemeClr>
+          </a:lnRef>
+          <a:fillRef idx="1">
+            <a:schemeClr val="accent1"/>
+          </a:fillRef>
+          <a:effectRef idx="0">
+            <a:schemeClr val="accent1"/>
+          </a:effectRef>
+          <a:fontRef idx="minor">
+            <a:schemeClr val="lt1"/>
+          </a:fontRef>
+        </p:style>
+        <p:txBody>
+          <a:bodyPr rtlCol="0" anchor="ctr"/>
+          <a:lstStyle/>
+          <a:p>
+            <a:pPr algn="ctr"/>
+            <a:endParaRPr lang="en-US"/>
+          </a:p>
+        </p:txBody>
+      </p:sp>
+      <p:graphicFrame>
+        <p:nvGraphicFramePr>
+          <p:cNvPr id="5" name="Table 5">
+            <a:extLst>
+              <a:ext uri="{FF2B5EF4-FFF2-40B4-BE49-F238E27FC236}">
+                <a16:creationId xmlns:a16="http://schemas.microsoft.com/office/drawing/2014/main" id="{16397911-A60D-4983-60D6-96237228DD02}"/>
+              </a:ext>
+            </a:extLst>
+          </p:cNvPr>
+          <p:cNvGraphicFramePr>
+            <a:graphicFrameLocks noGrp="1"/>
+          </p:cNvGraphicFramePr>
+          <p:nvPr>
+            <p:extLst>
+              <p:ext uri="{D42A27DB-BD31-4B8C-83A1-F6EECF244321}">
+                <p14:modId xmlns:p14="http://schemas.microsoft.com/office/powerpoint/2010/main" val="2481394370"/>
+              </p:ext>
+            </p:extLst>
+          </p:nvPr>
+        </p:nvGraphicFramePr>
+        <p:xfrm>
+          <a:off x="1991148" y="1953767"/>
+          <a:ext cx="8209704" cy="2950464"/>
+        </p:xfrm>
+        <a:graphic>
+          <a:graphicData uri="http://schemas.openxmlformats.org/drawingml/2006/table">
+            <a:tbl>
+              <a:tblPr firstRow="1" bandRow="1">
+                <a:tableStyleId>{5C22544A-7EE6-4342-B048-85BDC9FD1C3A}</a:tableStyleId>
+              </a:tblPr>
+              <a:tblGrid>
+                <a:gridCol w="5792894">
+                  <a:extLst>
+                    <a:ext uri="{9D8B030D-6E8A-4147-A177-3AD203B41FA5}">
+                      <a16:colId xmlns:a16="http://schemas.microsoft.com/office/drawing/2014/main" val="1310152373"/>
+                    </a:ext>
+                  </a:extLst>
+                </a:gridCol>
+                <a:gridCol w="2416810">
+                  <a:extLst>
+                    <a:ext uri="{9D8B030D-6E8A-4147-A177-3AD203B41FA5}">
+                      <a16:colId xmlns:a16="http://schemas.microsoft.com/office/drawing/2014/main" val="3602471781"/>
+                    </a:ext>
+                  </a:extLst>
+                </a:gridCol>
+              </a:tblGrid>
+              <a:tr h="737616">
+                <a:tc>
+                  <a:txBody>
+                    <a:bodyPr/>
+                    <a:lstStyle/>
+                    <a:p>
+                      <a:r>
+                        <a:rPr lang="en-US" sz="3300"/>
+                        <a:t>Total number of observation</a:t>
+                      </a:r>
+                      <a:endParaRPr lang="en-KE" sz="3300"/>
+                    </a:p>
+                  </a:txBody>
+                  <a:tcPr marL="167640" marR="167640" marT="83820" marB="83820"/>
+                </a:tc>
+                <a:tc>
+                  <a:txBody>
+                    <a:bodyPr/>
+                    <a:lstStyle/>
+                    <a:p>
+                      <a:r>
+                        <a:rPr lang="en-US" sz="3300"/>
+                        <a:t>20000</a:t>
+                      </a:r>
+                      <a:endParaRPr lang="en-KE" sz="3300"/>
+                    </a:p>
+                  </a:txBody>
+                  <a:tcPr marL="167640" marR="167640" marT="83820" marB="83820"/>
+                </a:tc>
+                <a:extLst>
+                  <a:ext uri="{0D108BD9-81ED-4DB2-BD59-A6C34878D82A}">
+                    <a16:rowId xmlns:a16="http://schemas.microsoft.com/office/drawing/2014/main" val="258419646"/>
+                  </a:ext>
+                </a:extLst>
+              </a:tr>
+              <a:tr h="737616">
+                <a:tc>
+                  <a:txBody>
+                    <a:bodyPr/>
+                    <a:lstStyle/>
+                    <a:p>
+                      <a:r>
+                        <a:rPr lang="en-US" sz="3300"/>
+                        <a:t>Total number of features</a:t>
+                      </a:r>
+                      <a:endParaRPr lang="en-KE" sz="3300"/>
+                    </a:p>
+                  </a:txBody>
+                  <a:tcPr marL="167640" marR="167640" marT="83820" marB="83820"/>
+                </a:tc>
+                <a:tc>
+                  <a:txBody>
+                    <a:bodyPr/>
+                    <a:lstStyle/>
+                    <a:p>
+                      <a:r>
+                        <a:rPr lang="en-US" sz="3300"/>
+                        <a:t>8</a:t>
+                      </a:r>
+                      <a:endParaRPr lang="en-KE" sz="3300"/>
+                    </a:p>
+                  </a:txBody>
+                  <a:tcPr marL="167640" marR="167640" marT="83820" marB="83820"/>
+                </a:tc>
+                <a:extLst>
+                  <a:ext uri="{0D108BD9-81ED-4DB2-BD59-A6C34878D82A}">
+                    <a16:rowId xmlns:a16="http://schemas.microsoft.com/office/drawing/2014/main" val="925194469"/>
+                  </a:ext>
+                </a:extLst>
+              </a:tr>
+              <a:tr h="737616">
+                <a:tc>
+                  <a:txBody>
+                    <a:bodyPr/>
+                    <a:lstStyle/>
+                    <a:p>
+                      <a:r>
+                        <a:rPr lang="en-US" sz="3300"/>
+                        <a:t>Base format of the file</a:t>
+                      </a:r>
+                      <a:endParaRPr lang="en-KE" sz="3300"/>
+                    </a:p>
+                  </a:txBody>
+                  <a:tcPr marL="167640" marR="167640" marT="83820" marB="83820"/>
+                </a:tc>
+                <a:tc>
+                  <a:txBody>
+                    <a:bodyPr/>
+                    <a:lstStyle/>
+                    <a:p>
+                      <a:r>
+                        <a:rPr lang="en-US" sz="3300"/>
+                        <a:t>.csv</a:t>
+                      </a:r>
+                      <a:endParaRPr lang="en-KE" sz="3300"/>
+                    </a:p>
+                  </a:txBody>
+                  <a:tcPr marL="167640" marR="167640" marT="83820" marB="83820"/>
+                </a:tc>
+                <a:extLst>
+                  <a:ext uri="{0D108BD9-81ED-4DB2-BD59-A6C34878D82A}">
+                    <a16:rowId xmlns:a16="http://schemas.microsoft.com/office/drawing/2014/main" val="3384269822"/>
+                  </a:ext>
+                </a:extLst>
+              </a:tr>
+              <a:tr h="737616">
+                <a:tc>
+                  <a:txBody>
+                    <a:bodyPr/>
+                    <a:lstStyle/>
+                    <a:p>
+                      <a:r>
+                        <a:rPr lang="en-US" sz="3300"/>
+                        <a:t>Size of the data</a:t>
+                      </a:r>
+                      <a:endParaRPr lang="en-KE" sz="3300"/>
+                    </a:p>
+                  </a:txBody>
+                  <a:tcPr marL="167640" marR="167640" marT="83820" marB="83820"/>
+                </a:tc>
+                <a:tc>
+                  <a:txBody>
+                    <a:bodyPr/>
+                    <a:lstStyle/>
+                    <a:p>
+                      <a:r>
+                        <a:rPr lang="en-US" sz="3300"/>
+                        <a:t>20663 KB</a:t>
+                      </a:r>
+                      <a:endParaRPr lang="en-KE" sz="3300"/>
+                    </a:p>
+                  </a:txBody>
+                  <a:tcPr marL="167640" marR="167640" marT="83820" marB="83820"/>
+                </a:tc>
+                <a:extLst>
+                  <a:ext uri="{0D108BD9-81ED-4DB2-BD59-A6C34878D82A}">
+                    <a16:rowId xmlns:a16="http://schemas.microsoft.com/office/drawing/2014/main" val="2003230526"/>
+                  </a:ext>
+                </a:extLst>
+              </a:tr>
+            </a:tbl>
+          </a:graphicData>
+        </a:graphic>
+      </p:graphicFrame>
+    </p:spTree>
+    <p:extLst>
+      <p:ext uri="{BB962C8B-B14F-4D97-AF65-F5344CB8AC3E}">
+        <p14:creationId xmlns:p14="http://schemas.microsoft.com/office/powerpoint/2010/main" val="3404148500"/>
+      </p:ext>
+    </p:extLst>
+  </p:cSld>
+  <p:clrMapOvr>
+    <a:masterClrMapping/>
+  </p:clrMapOvr>
+</p:sld>
+</file>
+
+<file path=ppt/slides/slide14.xml><?xml version="1.0" encoding="utf-8"?>
 <p:sld xmlns:a="http://schemas.openxmlformats.org/drawingml/2006/main" xmlns:r="http://schemas.openxmlformats.org/officeDocument/2006/relationships" xmlns:p="http://schemas.openxmlformats.org/presentationml/2006/main">
   <p:cSld>
     <p:bg>
@@ -6560,7 +8159,7 @@
 </p:sld>
 </file>
 
-<file path=ppt/slides/slide11.xml><?xml version="1.0" encoding="utf-8"?>
+<file path=ppt/slides/slide15.xml><?xml version="1.0" encoding="utf-8"?>
 <p:sld xmlns:a="http://schemas.openxmlformats.org/drawingml/2006/main" xmlns:r="http://schemas.openxmlformats.org/officeDocument/2006/relationships" xmlns:p="http://schemas.openxmlformats.org/presentationml/2006/main">
   <p:cSld>
     <p:bg>
@@ -7144,7 +8743,7 @@
 </p:sld>
 </file>
 
-<file path=ppt/slides/slide12.xml><?xml version="1.0" encoding="utf-8"?>
+<file path=ppt/slides/slide16.xml><?xml version="1.0" encoding="utf-8"?>
 <p:sld xmlns:a="http://schemas.openxmlformats.org/drawingml/2006/main" xmlns:r="http://schemas.openxmlformats.org/officeDocument/2006/relationships" xmlns:p="http://schemas.openxmlformats.org/presentationml/2006/main">
   <p:cSld>
     <p:bg>
@@ -7494,7 +9093,7 @@
 </p:sld>
 </file>
 
-<file path=ppt/slides/slide13.xml><?xml version="1.0" encoding="utf-8"?>
+<file path=ppt/slides/slide17.xml><?xml version="1.0" encoding="utf-8"?>
 <p:sld xmlns:a="http://schemas.openxmlformats.org/drawingml/2006/main" xmlns:r="http://schemas.openxmlformats.org/officeDocument/2006/relationships" xmlns:p="http://schemas.openxmlformats.org/presentationml/2006/main">
   <p:cSld>
     <p:bg>
@@ -7844,7 +9443,7 @@
 </p:sld>
 </file>
 
-<file path=ppt/slides/slide14.xml><?xml version="1.0" encoding="utf-8"?>
+<file path=ppt/slides/slide18.xml><?xml version="1.0" encoding="utf-8"?>
 <p:sld xmlns:a="http://schemas.openxmlformats.org/drawingml/2006/main" xmlns:r="http://schemas.openxmlformats.org/officeDocument/2006/relationships" xmlns:p="http://schemas.openxmlformats.org/presentationml/2006/main">
   <p:cSld>
     <p:bg>
@@ -8328,7 +9927,7 @@
 </p:sld>
 </file>
 
-<file path=ppt/slides/slide15.xml><?xml version="1.0" encoding="utf-8"?>
+<file path=ppt/slides/slide19.xml><?xml version="1.0" encoding="utf-8"?>
 <p:sld xmlns:a="http://schemas.openxmlformats.org/drawingml/2006/main" xmlns:r="http://schemas.openxmlformats.org/officeDocument/2006/relationships" xmlns:p="http://schemas.openxmlformats.org/presentationml/2006/main">
   <p:cSld>
     <p:spTree>
@@ -8727,6 +10326,785 @@
 </file>
 
 <file path=ppt/slides/slide3.xml><?xml version="1.0" encoding="utf-8"?>
+<p:sld xmlns:a="http://schemas.openxmlformats.org/drawingml/2006/main" xmlns:r="http://schemas.openxmlformats.org/officeDocument/2006/relationships" xmlns:p="http://schemas.openxmlformats.org/presentationml/2006/main">
+  <p:cSld>
+    <p:bg>
+      <p:bgPr>
+        <a:solidFill>
+          <a:schemeClr val="bg1"/>
+        </a:solidFill>
+        <a:effectLst/>
+      </p:bgPr>
+    </p:bg>
+    <p:spTree>
+      <p:nvGrpSpPr>
+        <p:cNvPr id="1" name=""/>
+        <p:cNvGrpSpPr/>
+        <p:nvPr/>
+      </p:nvGrpSpPr>
+      <p:grpSpPr>
+        <a:xfrm>
+          <a:off x="0" y="0"/>
+          <a:ext cx="0" cy="0"/>
+          <a:chOff x="0" y="0"/>
+          <a:chExt cx="0" cy="0"/>
+        </a:xfrm>
+      </p:grpSpPr>
+      <p:sp>
+        <p:nvSpPr>
+          <p:cNvPr id="10" name="Rectangle 9">
+            <a:extLst>
+              <a:ext uri="{FF2B5EF4-FFF2-40B4-BE49-F238E27FC236}">
+                <a16:creationId xmlns:a16="http://schemas.microsoft.com/office/drawing/2014/main" id="{F3060C83-F051-4F0E-ABAD-AA0DFC48B218}"/>
+              </a:ext>
+              <a:ext uri="{C183D7F6-B498-43B3-948B-1728B52AA6E4}">
+                <adec:decorative xmlns:adec="http://schemas.microsoft.com/office/drawing/2017/decorative" val="1"/>
+              </a:ext>
+            </a:extLst>
+          </p:cNvPr>
+          <p:cNvSpPr>
+            <a:spLocks noGrp="1" noRot="1" noChangeAspect="1" noMove="1" noResize="1" noEditPoints="1" noAdjustHandles="1" noChangeArrowheads="1" noChangeShapeType="1" noTextEdit="1"/>
+          </p:cNvSpPr>
+          <p:nvPr>
+            <p:extLst>
+              <p:ext uri="{386F3935-93C4-4BCD-93E2-E3B085C9AB24}">
+                <p16:designElem xmlns:p16="http://schemas.microsoft.com/office/powerpoint/2015/main" val="1"/>
+              </p:ext>
+            </p:extLst>
+          </p:nvPr>
+        </p:nvSpPr>
+        <p:spPr>
+          <a:xfrm>
+            <a:off x="0" y="0"/>
+            <a:ext cx="12192000" cy="6858000"/>
+          </a:xfrm>
+          <a:prstGeom prst="rect">
+            <a:avLst/>
+          </a:prstGeom>
+          <a:solidFill>
+            <a:schemeClr val="bg1"/>
+          </a:solidFill>
+          <a:ln>
+            <a:noFill/>
+          </a:ln>
+        </p:spPr>
+        <p:style>
+          <a:lnRef idx="2">
+            <a:schemeClr val="accent1">
+              <a:shade val="50000"/>
+            </a:schemeClr>
+          </a:lnRef>
+          <a:fillRef idx="1">
+            <a:schemeClr val="accent1"/>
+          </a:fillRef>
+          <a:effectRef idx="0">
+            <a:schemeClr val="accent1"/>
+          </a:effectRef>
+          <a:fontRef idx="minor">
+            <a:schemeClr val="lt1"/>
+          </a:fontRef>
+        </p:style>
+        <p:txBody>
+          <a:bodyPr rtlCol="0" anchor="ctr"/>
+          <a:lstStyle/>
+          <a:p>
+            <a:pPr algn="ctr"/>
+            <a:endParaRPr lang="en-US" dirty="0"/>
+          </a:p>
+        </p:txBody>
+      </p:sp>
+      <p:sp>
+        <p:nvSpPr>
+          <p:cNvPr id="12" name="Freeform: Shape 11">
+            <a:extLst>
+              <a:ext uri="{FF2B5EF4-FFF2-40B4-BE49-F238E27FC236}">
+                <a16:creationId xmlns:a16="http://schemas.microsoft.com/office/drawing/2014/main" id="{83C98ABE-055B-441F-B07E-44F97F083C39}"/>
+              </a:ext>
+              <a:ext uri="{C183D7F6-B498-43B3-948B-1728B52AA6E4}">
+                <adec:decorative xmlns:adec="http://schemas.microsoft.com/office/drawing/2017/decorative" val="1"/>
+              </a:ext>
+            </a:extLst>
+          </p:cNvPr>
+          <p:cNvSpPr>
+            <a:spLocks noGrp="1" noRot="1" noChangeAspect="1" noMove="1" noResize="1" noEditPoints="1" noAdjustHandles="1" noChangeArrowheads="1" noChangeShapeType="1" noTextEdit="1"/>
+          </p:cNvSpPr>
+          <p:nvPr>
+            <p:extLst>
+              <p:ext uri="{386F3935-93C4-4BCD-93E2-E3B085C9AB24}">
+                <p16:designElem xmlns:p16="http://schemas.microsoft.com/office/powerpoint/2015/main" val="1"/>
+              </p:ext>
+            </p:extLst>
+          </p:nvPr>
+        </p:nvSpPr>
+        <p:spPr>
+          <a:xfrm rot="18900000" flipH="1">
+            <a:off x="-376156" y="-253670"/>
+            <a:ext cx="1827638" cy="1376989"/>
+          </a:xfrm>
+          <a:custGeom>
+            <a:avLst/>
+            <a:gdLst>
+              <a:gd name="connsiteX0" fmla="*/ 0 w 1827638"/>
+              <a:gd name="connsiteY0" fmla="*/ 987379 h 1376989"/>
+              <a:gd name="connsiteX1" fmla="*/ 987379 w 1827638"/>
+              <a:gd name="connsiteY1" fmla="*/ 0 h 1376989"/>
+              <a:gd name="connsiteX2" fmla="*/ 1827638 w 1827638"/>
+              <a:gd name="connsiteY2" fmla="*/ 840260 h 1376989"/>
+              <a:gd name="connsiteX3" fmla="*/ 1827638 w 1827638"/>
+              <a:gd name="connsiteY3" fmla="*/ 1376989 h 1376989"/>
+              <a:gd name="connsiteX4" fmla="*/ 0 w 1827638"/>
+              <a:gd name="connsiteY4" fmla="*/ 1376989 h 1376989"/>
+            </a:gdLst>
+            <a:ahLst/>
+            <a:cxnLst>
+              <a:cxn ang="0">
+                <a:pos x="connsiteX0" y="connsiteY0"/>
+              </a:cxn>
+              <a:cxn ang="0">
+                <a:pos x="connsiteX1" y="connsiteY1"/>
+              </a:cxn>
+              <a:cxn ang="0">
+                <a:pos x="connsiteX2" y="connsiteY2"/>
+              </a:cxn>
+              <a:cxn ang="0">
+                <a:pos x="connsiteX3" y="connsiteY3"/>
+              </a:cxn>
+              <a:cxn ang="0">
+                <a:pos x="connsiteX4" y="connsiteY4"/>
+              </a:cxn>
+            </a:cxnLst>
+            <a:rect l="l" t="t" r="r" b="b"/>
+            <a:pathLst>
+              <a:path w="1827638" h="1376989">
+                <a:moveTo>
+                  <a:pt x="0" y="987379"/>
+                </a:moveTo>
+                <a:lnTo>
+                  <a:pt x="987379" y="0"/>
+                </a:lnTo>
+                <a:lnTo>
+                  <a:pt x="1827638" y="840260"/>
+                </a:lnTo>
+                <a:lnTo>
+                  <a:pt x="1827638" y="1376989"/>
+                </a:lnTo>
+                <a:lnTo>
+                  <a:pt x="0" y="1376989"/>
+                </a:lnTo>
+                <a:close/>
+              </a:path>
+            </a:pathLst>
+          </a:custGeom>
+          <a:solidFill>
+            <a:schemeClr val="accent1">
+              <a:alpha val="30000"/>
+            </a:schemeClr>
+          </a:solidFill>
+          <a:ln>
+            <a:noFill/>
+          </a:ln>
+        </p:spPr>
+        <p:style>
+          <a:lnRef idx="2">
+            <a:schemeClr val="accent1">
+              <a:shade val="50000"/>
+            </a:schemeClr>
+          </a:lnRef>
+          <a:fillRef idx="1">
+            <a:schemeClr val="accent1"/>
+          </a:fillRef>
+          <a:effectRef idx="0">
+            <a:schemeClr val="accent1"/>
+          </a:effectRef>
+          <a:fontRef idx="minor">
+            <a:schemeClr val="lt1"/>
+          </a:fontRef>
+        </p:style>
+        <p:txBody>
+          <a:bodyPr rtlCol="0" anchor="ctr"/>
+          <a:lstStyle/>
+          <a:p>
+            <a:pPr algn="ctr"/>
+            <a:endParaRPr lang="en-US" dirty="0"/>
+          </a:p>
+        </p:txBody>
+      </p:sp>
+      <p:sp>
+        <p:nvSpPr>
+          <p:cNvPr id="14" name="Rectangle 13">
+            <a:extLst>
+              <a:ext uri="{FF2B5EF4-FFF2-40B4-BE49-F238E27FC236}">
+                <a16:creationId xmlns:a16="http://schemas.microsoft.com/office/drawing/2014/main" id="{29FDB030-9B49-4CED-8CCD-4D99382388AC}"/>
+              </a:ext>
+              <a:ext uri="{C183D7F6-B498-43B3-948B-1728B52AA6E4}">
+                <adec:decorative xmlns:adec="http://schemas.microsoft.com/office/drawing/2017/decorative" val="1"/>
+              </a:ext>
+            </a:extLst>
+          </p:cNvPr>
+          <p:cNvSpPr>
+            <a:spLocks noGrp="1" noRot="1" noChangeAspect="1" noMove="1" noResize="1" noEditPoints="1" noAdjustHandles="1" noChangeArrowheads="1" noChangeShapeType="1" noTextEdit="1"/>
+          </p:cNvSpPr>
+          <p:nvPr>
+            <p:extLst>
+              <p:ext uri="{386F3935-93C4-4BCD-93E2-E3B085C9AB24}">
+                <p16:designElem xmlns:p16="http://schemas.microsoft.com/office/powerpoint/2015/main" val="1"/>
+              </p:ext>
+            </p:extLst>
+          </p:nvPr>
+        </p:nvSpPr>
+        <p:spPr>
+          <a:xfrm rot="18900000" flipH="1">
+            <a:off x="891641" y="422146"/>
+            <a:ext cx="645368" cy="645368"/>
+          </a:xfrm>
+          <a:prstGeom prst="rect">
+            <a:avLst/>
+          </a:prstGeom>
+          <a:solidFill>
+            <a:schemeClr val="accent1">
+              <a:alpha val="30000"/>
+            </a:schemeClr>
+          </a:solidFill>
+          <a:ln>
+            <a:noFill/>
+          </a:ln>
+        </p:spPr>
+        <p:style>
+          <a:lnRef idx="2">
+            <a:schemeClr val="accent1">
+              <a:shade val="50000"/>
+            </a:schemeClr>
+          </a:lnRef>
+          <a:fillRef idx="1">
+            <a:schemeClr val="accent1"/>
+          </a:fillRef>
+          <a:effectRef idx="0">
+            <a:schemeClr val="accent1"/>
+          </a:effectRef>
+          <a:fontRef idx="minor">
+            <a:schemeClr val="lt1"/>
+          </a:fontRef>
+        </p:style>
+        <p:txBody>
+          <a:bodyPr rtlCol="0" anchor="ctr"/>
+          <a:lstStyle/>
+          <a:p>
+            <a:pPr algn="ctr"/>
+            <a:endParaRPr lang="en-US"/>
+          </a:p>
+        </p:txBody>
+      </p:sp>
+      <p:sp>
+        <p:nvSpPr>
+          <p:cNvPr id="16" name="Rectangle 15">
+            <a:extLst>
+              <a:ext uri="{FF2B5EF4-FFF2-40B4-BE49-F238E27FC236}">
+                <a16:creationId xmlns:a16="http://schemas.microsoft.com/office/drawing/2014/main" id="{3783CA14-24A1-485C-8B30-D6A5D87987AD}"/>
+              </a:ext>
+              <a:ext uri="{C183D7F6-B498-43B3-948B-1728B52AA6E4}">
+                <adec:decorative xmlns:adec="http://schemas.microsoft.com/office/drawing/2017/decorative" val="1"/>
+              </a:ext>
+            </a:extLst>
+          </p:cNvPr>
+          <p:cNvSpPr>
+            <a:spLocks noGrp="1" noRot="1" noChangeAspect="1" noMove="1" noResize="1" noEditPoints="1" noAdjustHandles="1" noChangeArrowheads="1" noChangeShapeType="1" noTextEdit="1"/>
+          </p:cNvSpPr>
+          <p:nvPr>
+            <p:extLst>
+              <p:ext uri="{386F3935-93C4-4BCD-93E2-E3B085C9AB24}">
+                <p16:designElem xmlns:p16="http://schemas.microsoft.com/office/powerpoint/2015/main" val="1"/>
+              </p:ext>
+            </p:extLst>
+          </p:nvPr>
+        </p:nvSpPr>
+        <p:spPr>
+          <a:xfrm rot="18900000" flipH="1">
+            <a:off x="10043482" y="655140"/>
+            <a:ext cx="687472" cy="687472"/>
+          </a:xfrm>
+          <a:prstGeom prst="rect">
+            <a:avLst/>
+          </a:prstGeom>
+          <a:solidFill>
+            <a:schemeClr val="accent4">
+              <a:alpha val="30000"/>
+            </a:schemeClr>
+          </a:solidFill>
+          <a:ln>
+            <a:noFill/>
+          </a:ln>
+        </p:spPr>
+        <p:style>
+          <a:lnRef idx="2">
+            <a:schemeClr val="accent1">
+              <a:shade val="50000"/>
+            </a:schemeClr>
+          </a:lnRef>
+          <a:fillRef idx="1">
+            <a:schemeClr val="accent1"/>
+          </a:fillRef>
+          <a:effectRef idx="0">
+            <a:schemeClr val="accent1"/>
+          </a:effectRef>
+          <a:fontRef idx="minor">
+            <a:schemeClr val="lt1"/>
+          </a:fontRef>
+        </p:style>
+        <p:txBody>
+          <a:bodyPr rtlCol="0" anchor="ctr"/>
+          <a:lstStyle/>
+          <a:p>
+            <a:pPr algn="ctr"/>
+            <a:endParaRPr lang="en-US"/>
+          </a:p>
+        </p:txBody>
+      </p:sp>
+      <p:sp>
+        <p:nvSpPr>
+          <p:cNvPr id="18" name="Freeform: Shape 17">
+            <a:extLst>
+              <a:ext uri="{FF2B5EF4-FFF2-40B4-BE49-F238E27FC236}">
+                <a16:creationId xmlns:a16="http://schemas.microsoft.com/office/drawing/2014/main" id="{9A97C86A-04D6-40F7-AE84-31AB43E6A846}"/>
+              </a:ext>
+              <a:ext uri="{C183D7F6-B498-43B3-948B-1728B52AA6E4}">
+                <adec:decorative xmlns:adec="http://schemas.microsoft.com/office/drawing/2017/decorative" val="1"/>
+              </a:ext>
+            </a:extLst>
+          </p:cNvPr>
+          <p:cNvSpPr>
+            <a:spLocks noGrp="1" noRot="1" noChangeAspect="1" noMove="1" noResize="1" noEditPoints="1" noAdjustHandles="1" noChangeArrowheads="1" noChangeShapeType="1" noTextEdit="1"/>
+          </p:cNvSpPr>
+          <p:nvPr>
+            <p:extLst>
+              <p:ext uri="{386F3935-93C4-4BCD-93E2-E3B085C9AB24}">
+                <p16:designElem xmlns:p16="http://schemas.microsoft.com/office/powerpoint/2015/main" val="1"/>
+              </p:ext>
+            </p:extLst>
+          </p:nvPr>
+        </p:nvSpPr>
+        <p:spPr>
+          <a:xfrm rot="10800000" flipH="1">
+            <a:off x="9356643" y="0"/>
+            <a:ext cx="2835357" cy="1480837"/>
+          </a:xfrm>
+          <a:custGeom>
+            <a:avLst/>
+            <a:gdLst>
+              <a:gd name="connsiteX0" fmla="*/ 2835357 w 2835357"/>
+              <a:gd name="connsiteY0" fmla="*/ 1480837 h 1480837"/>
+              <a:gd name="connsiteX1" fmla="*/ 0 w 2835357"/>
+              <a:gd name="connsiteY1" fmla="*/ 1480837 h 1480837"/>
+              <a:gd name="connsiteX2" fmla="*/ 1552727 w 2835357"/>
+              <a:gd name="connsiteY2" fmla="*/ 0 h 1480837"/>
+              <a:gd name="connsiteX3" fmla="*/ 2835357 w 2835357"/>
+              <a:gd name="connsiteY3" fmla="*/ 1223245 h 1480837"/>
+            </a:gdLst>
+            <a:ahLst/>
+            <a:cxnLst>
+              <a:cxn ang="0">
+                <a:pos x="connsiteX0" y="connsiteY0"/>
+              </a:cxn>
+              <a:cxn ang="0">
+                <a:pos x="connsiteX1" y="connsiteY1"/>
+              </a:cxn>
+              <a:cxn ang="0">
+                <a:pos x="connsiteX2" y="connsiteY2"/>
+              </a:cxn>
+              <a:cxn ang="0">
+                <a:pos x="connsiteX3" y="connsiteY3"/>
+              </a:cxn>
+            </a:cxnLst>
+            <a:rect l="l" t="t" r="r" b="b"/>
+            <a:pathLst>
+              <a:path w="2835357" h="1480837">
+                <a:moveTo>
+                  <a:pt x="2835357" y="1480837"/>
+                </a:moveTo>
+                <a:lnTo>
+                  <a:pt x="0" y="1480837"/>
+                </a:lnTo>
+                <a:lnTo>
+                  <a:pt x="1552727" y="0"/>
+                </a:lnTo>
+                <a:lnTo>
+                  <a:pt x="2835357" y="1223245"/>
+                </a:lnTo>
+                <a:close/>
+              </a:path>
+            </a:pathLst>
+          </a:custGeom>
+          <a:solidFill>
+            <a:schemeClr val="accent4">
+              <a:alpha val="30000"/>
+            </a:schemeClr>
+          </a:solidFill>
+          <a:ln>
+            <a:noFill/>
+          </a:ln>
+        </p:spPr>
+        <p:style>
+          <a:lnRef idx="2">
+            <a:schemeClr val="accent1">
+              <a:shade val="50000"/>
+            </a:schemeClr>
+          </a:lnRef>
+          <a:fillRef idx="1">
+            <a:schemeClr val="accent1"/>
+          </a:fillRef>
+          <a:effectRef idx="0">
+            <a:schemeClr val="accent1"/>
+          </a:effectRef>
+          <a:fontRef idx="minor">
+            <a:schemeClr val="lt1"/>
+          </a:fontRef>
+        </p:style>
+        <p:txBody>
+          <a:bodyPr wrap="square" rtlCol="0" anchor="ctr">
+            <a:noAutofit/>
+          </a:bodyPr>
+          <a:lstStyle/>
+          <a:p>
+            <a:pPr algn="ctr"/>
+            <a:endParaRPr lang="en-US" dirty="0"/>
+          </a:p>
+        </p:txBody>
+      </p:sp>
+      <p:sp>
+        <p:nvSpPr>
+          <p:cNvPr id="20" name="Isosceles Triangle 19">
+            <a:extLst>
+              <a:ext uri="{FF2B5EF4-FFF2-40B4-BE49-F238E27FC236}">
+                <a16:creationId xmlns:a16="http://schemas.microsoft.com/office/drawing/2014/main" id="{FF9F2414-84E8-453E-B1F3-389FDE8192D9}"/>
+              </a:ext>
+              <a:ext uri="{C183D7F6-B498-43B3-948B-1728B52AA6E4}">
+                <adec:decorative xmlns:adec="http://schemas.microsoft.com/office/drawing/2017/decorative" val="1"/>
+              </a:ext>
+            </a:extLst>
+          </p:cNvPr>
+          <p:cNvSpPr>
+            <a:spLocks noGrp="1" noRot="1" noChangeAspect="1" noMove="1" noResize="1" noEditPoints="1" noAdjustHandles="1" noChangeArrowheads="1" noChangeShapeType="1" noTextEdit="1"/>
+          </p:cNvSpPr>
+          <p:nvPr>
+            <p:extLst>
+              <p:ext uri="{386F3935-93C4-4BCD-93E2-E3B085C9AB24}">
+                <p16:designElem xmlns:p16="http://schemas.microsoft.com/office/powerpoint/2015/main" val="1"/>
+              </p:ext>
+            </p:extLst>
+          </p:nvPr>
+        </p:nvSpPr>
+        <p:spPr>
+          <a:xfrm flipH="1">
+            <a:off x="7976344" y="6115501"/>
+            <a:ext cx="1494513" cy="742499"/>
+          </a:xfrm>
+          <a:prstGeom prst="triangle">
+            <a:avLst/>
+          </a:prstGeom>
+          <a:solidFill>
+            <a:schemeClr val="accent1">
+              <a:alpha val="30000"/>
+            </a:schemeClr>
+          </a:solidFill>
+          <a:ln>
+            <a:noFill/>
+          </a:ln>
+        </p:spPr>
+        <p:style>
+          <a:lnRef idx="2">
+            <a:schemeClr val="accent1">
+              <a:shade val="50000"/>
+            </a:schemeClr>
+          </a:lnRef>
+          <a:fillRef idx="1">
+            <a:schemeClr val="accent1"/>
+          </a:fillRef>
+          <a:effectRef idx="0">
+            <a:schemeClr val="accent1"/>
+          </a:effectRef>
+          <a:fontRef idx="minor">
+            <a:schemeClr val="lt1"/>
+          </a:fontRef>
+        </p:style>
+        <p:txBody>
+          <a:bodyPr rtlCol="0" anchor="ctr"/>
+          <a:lstStyle/>
+          <a:p>
+            <a:pPr algn="ctr"/>
+            <a:endParaRPr lang="en-US"/>
+          </a:p>
+        </p:txBody>
+      </p:sp>
+      <p:sp>
+        <p:nvSpPr>
+          <p:cNvPr id="22" name="Isosceles Triangle 21">
+            <a:extLst>
+              <a:ext uri="{FF2B5EF4-FFF2-40B4-BE49-F238E27FC236}">
+                <a16:creationId xmlns:a16="http://schemas.microsoft.com/office/drawing/2014/main" id="{3ECA69A1-7536-43AC-85EF-C7106179F5ED}"/>
+              </a:ext>
+              <a:ext uri="{C183D7F6-B498-43B3-948B-1728B52AA6E4}">
+                <adec:decorative xmlns:adec="http://schemas.microsoft.com/office/drawing/2017/decorative" val="1"/>
+              </a:ext>
+            </a:extLst>
+          </p:cNvPr>
+          <p:cNvSpPr>
+            <a:spLocks noGrp="1" noRot="1" noChangeAspect="1" noMove="1" noResize="1" noEditPoints="1" noAdjustHandles="1" noChangeArrowheads="1" noChangeShapeType="1" noTextEdit="1"/>
+          </p:cNvSpPr>
+          <p:nvPr>
+            <p:extLst>
+              <p:ext uri="{386F3935-93C4-4BCD-93E2-E3B085C9AB24}">
+                <p16:designElem xmlns:p16="http://schemas.microsoft.com/office/powerpoint/2015/main" val="1"/>
+              </p:ext>
+            </p:extLst>
+          </p:nvPr>
+        </p:nvSpPr>
+        <p:spPr>
+          <a:xfrm flipH="1">
+            <a:off x="7604080" y="6453143"/>
+            <a:ext cx="814903" cy="404857"/>
+          </a:xfrm>
+          <a:prstGeom prst="triangle">
+            <a:avLst/>
+          </a:prstGeom>
+          <a:solidFill>
+            <a:schemeClr val="accent1">
+              <a:alpha val="30000"/>
+            </a:schemeClr>
+          </a:solidFill>
+          <a:ln>
+            <a:noFill/>
+          </a:ln>
+        </p:spPr>
+        <p:style>
+          <a:lnRef idx="2">
+            <a:schemeClr val="accent1">
+              <a:shade val="50000"/>
+            </a:schemeClr>
+          </a:lnRef>
+          <a:fillRef idx="1">
+            <a:schemeClr val="accent1"/>
+          </a:fillRef>
+          <a:effectRef idx="0">
+            <a:schemeClr val="accent1"/>
+          </a:effectRef>
+          <a:fontRef idx="minor">
+            <a:schemeClr val="lt1"/>
+          </a:fontRef>
+        </p:style>
+        <p:txBody>
+          <a:bodyPr rtlCol="0" anchor="ctr"/>
+          <a:lstStyle/>
+          <a:p>
+            <a:pPr algn="ctr"/>
+            <a:endParaRPr lang="en-US"/>
+          </a:p>
+        </p:txBody>
+      </p:sp>
+      <p:graphicFrame>
+        <p:nvGraphicFramePr>
+          <p:cNvPr id="5" name="Table 5">
+            <a:extLst>
+              <a:ext uri="{FF2B5EF4-FFF2-40B4-BE49-F238E27FC236}">
+                <a16:creationId xmlns:a16="http://schemas.microsoft.com/office/drawing/2014/main" id="{77CCFEA0-96E4-3A5F-6A01-70E05D26D254}"/>
+              </a:ext>
+            </a:extLst>
+          </p:cNvPr>
+          <p:cNvGraphicFramePr>
+            <a:graphicFrameLocks noGrp="1"/>
+          </p:cNvGraphicFramePr>
+          <p:nvPr>
+            <p:extLst>
+              <p:ext uri="{D42A27DB-BD31-4B8C-83A1-F6EECF244321}">
+                <p14:modId xmlns:p14="http://schemas.microsoft.com/office/powerpoint/2010/main" val="899707355"/>
+              </p:ext>
+            </p:extLst>
+          </p:nvPr>
+        </p:nvGraphicFramePr>
+        <p:xfrm>
+          <a:off x="2782782" y="1450847"/>
+          <a:ext cx="6626437" cy="3956304"/>
+        </p:xfrm>
+        <a:graphic>
+          <a:graphicData uri="http://schemas.openxmlformats.org/drawingml/2006/table">
+            <a:tbl>
+              <a:tblPr firstRow="1" bandRow="1">
+                <a:tableStyleId>{9D7B26C5-4107-4FEC-AEDC-1716B250A1EF}</a:tableStyleId>
+              </a:tblPr>
+              <a:tblGrid>
+                <a:gridCol w="5140960">
+                  <a:extLst>
+                    <a:ext uri="{9D8B030D-6E8A-4147-A177-3AD203B41FA5}">
+                      <a16:colId xmlns:a16="http://schemas.microsoft.com/office/drawing/2014/main" val="1635227183"/>
+                    </a:ext>
+                  </a:extLst>
+                </a:gridCol>
+                <a:gridCol w="1485477">
+                  <a:extLst>
+                    <a:ext uri="{9D8B030D-6E8A-4147-A177-3AD203B41FA5}">
+                      <a16:colId xmlns:a16="http://schemas.microsoft.com/office/drawing/2014/main" val="2531034078"/>
+                    </a:ext>
+                  </a:extLst>
+                </a:gridCol>
+              </a:tblGrid>
+              <a:tr h="1240536">
+                <a:tc>
+                  <a:txBody>
+                    <a:bodyPr/>
+                    <a:lstStyle/>
+                    <a:p>
+                      <a:r>
+                        <a:rPr lang="en-US" sz="3300"/>
+                        <a:t>Total number of observations</a:t>
+                      </a:r>
+                      <a:endParaRPr lang="en-KE" sz="3300"/>
+                    </a:p>
+                  </a:txBody>
+                  <a:tcPr marL="167640" marR="167640" marT="83820" marB="83820"/>
+                </a:tc>
+                <a:tc>
+                  <a:txBody>
+                    <a:bodyPr/>
+                    <a:lstStyle/>
+                    <a:p>
+                      <a:r>
+                        <a:rPr lang="en-US" sz="3300"/>
+                        <a:t>19</a:t>
+                      </a:r>
+                      <a:endParaRPr lang="en-KE" sz="3300"/>
+                    </a:p>
+                  </a:txBody>
+                  <a:tcPr marL="167640" marR="167640" marT="83820" marB="83820"/>
+                </a:tc>
+                <a:extLst>
+                  <a:ext uri="{0D108BD9-81ED-4DB2-BD59-A6C34878D82A}">
+                    <a16:rowId xmlns:a16="http://schemas.microsoft.com/office/drawing/2014/main" val="305848549"/>
+                  </a:ext>
+                </a:extLst>
+              </a:tr>
+              <a:tr h="1240536">
+                <a:tc>
+                  <a:txBody>
+                    <a:bodyPr/>
+                    <a:lstStyle/>
+                    <a:p>
+                      <a:r>
+                        <a:rPr lang="en-US" sz="3300"/>
+                        <a:t>Total number of features</a:t>
+                      </a:r>
+                    </a:p>
+                    <a:p>
+                      <a:endParaRPr lang="en-KE" sz="3300"/>
+                    </a:p>
+                  </a:txBody>
+                  <a:tcPr marL="167640" marR="167640" marT="83820" marB="83820"/>
+                </a:tc>
+                <a:tc>
+                  <a:txBody>
+                    <a:bodyPr/>
+                    <a:lstStyle/>
+                    <a:p>
+                      <a:r>
+                        <a:rPr lang="en-US" sz="3300"/>
+                        <a:t>3</a:t>
+                      </a:r>
+                      <a:endParaRPr lang="en-KE" sz="3300"/>
+                    </a:p>
+                  </a:txBody>
+                  <a:tcPr marL="167640" marR="167640" marT="83820" marB="83820"/>
+                </a:tc>
+                <a:extLst>
+                  <a:ext uri="{0D108BD9-81ED-4DB2-BD59-A6C34878D82A}">
+                    <a16:rowId xmlns:a16="http://schemas.microsoft.com/office/drawing/2014/main" val="1899834461"/>
+                  </a:ext>
+                </a:extLst>
+              </a:tr>
+              <a:tr h="737616">
+                <a:tc>
+                  <a:txBody>
+                    <a:bodyPr/>
+                    <a:lstStyle/>
+                    <a:p>
+                      <a:r>
+                        <a:rPr lang="en-US" sz="3300"/>
+                        <a:t>Base format of the file</a:t>
+                      </a:r>
+                      <a:endParaRPr lang="en-KE" sz="3300"/>
+                    </a:p>
+                  </a:txBody>
+                  <a:tcPr marL="167640" marR="167640" marT="83820" marB="83820"/>
+                </a:tc>
+                <a:tc>
+                  <a:txBody>
+                    <a:bodyPr/>
+                    <a:lstStyle/>
+                    <a:p>
+                      <a:r>
+                        <a:rPr lang="en-US" sz="3300"/>
+                        <a:t>.csv</a:t>
+                      </a:r>
+                      <a:endParaRPr lang="en-KE" sz="3300"/>
+                    </a:p>
+                  </a:txBody>
+                  <a:tcPr marL="167640" marR="167640" marT="83820" marB="83820"/>
+                </a:tc>
+                <a:extLst>
+                  <a:ext uri="{0D108BD9-81ED-4DB2-BD59-A6C34878D82A}">
+                    <a16:rowId xmlns:a16="http://schemas.microsoft.com/office/drawing/2014/main" val="2513969505"/>
+                  </a:ext>
+                </a:extLst>
+              </a:tr>
+              <a:tr h="737616">
+                <a:tc>
+                  <a:txBody>
+                    <a:bodyPr/>
+                    <a:lstStyle/>
+                    <a:p>
+                      <a:r>
+                        <a:rPr lang="en-US" sz="3300"/>
+                        <a:t>Size of the file</a:t>
+                      </a:r>
+                      <a:endParaRPr lang="en-KE" sz="3300"/>
+                    </a:p>
+                  </a:txBody>
+                  <a:tcPr marL="167640" marR="167640" marT="83820" marB="83820"/>
+                </a:tc>
+                <a:tc>
+                  <a:txBody>
+                    <a:bodyPr/>
+                    <a:lstStyle/>
+                    <a:p>
+                      <a:r>
+                        <a:rPr lang="en-US" sz="3300"/>
+                        <a:t>1 KB</a:t>
+                      </a:r>
+                      <a:endParaRPr lang="en-KE" sz="3300"/>
+                    </a:p>
+                  </a:txBody>
+                  <a:tcPr marL="167640" marR="167640" marT="83820" marB="83820"/>
+                </a:tc>
+                <a:extLst>
+                  <a:ext uri="{0D108BD9-81ED-4DB2-BD59-A6C34878D82A}">
+                    <a16:rowId xmlns:a16="http://schemas.microsoft.com/office/drawing/2014/main" val="462037397"/>
+                  </a:ext>
+                </a:extLst>
+              </a:tr>
+            </a:tbl>
+          </a:graphicData>
+        </a:graphic>
+      </p:graphicFrame>
+    </p:spTree>
+    <p:extLst>
+      <p:ext uri="{BB962C8B-B14F-4D97-AF65-F5344CB8AC3E}">
+        <p14:creationId xmlns:p14="http://schemas.microsoft.com/office/powerpoint/2010/main" val="3895547294"/>
+      </p:ext>
+    </p:extLst>
+  </p:cSld>
+  <p:clrMapOvr>
+    <a:masterClrMapping/>
+  </p:clrMapOvr>
+</p:sld>
+</file>
+
+<file path=ppt/slides/slide4.xml><?xml version="1.0" encoding="utf-8"?>
 <p:sld xmlns:a="http://schemas.openxmlformats.org/drawingml/2006/main" xmlns:r="http://schemas.openxmlformats.org/officeDocument/2006/relationships" xmlns:p="http://schemas.openxmlformats.org/presentationml/2006/main">
   <p:cSld>
     <p:bg>
@@ -9389,7 +11767,7 @@
               <a:buChar char="•"/>
             </a:pPr>
             <a:r>
-              <a:rPr lang="en-US" sz="1700"/>
+              <a:rPr lang="en-US" sz="1700" dirty="0"/>
               <a:t>From the graph we can conclude that New York city has the highest population. This means NY has the largest possible  market. </a:t>
             </a:r>
           </a:p>
@@ -9405,7 +11783,7 @@
               <a:buChar char="•"/>
             </a:pPr>
             <a:r>
-              <a:rPr lang="en-US" sz="1700"/>
+              <a:rPr lang="en-US" sz="1700" dirty="0"/>
               <a:t>NY also requires a lot of service providing facilities due to its large scale.</a:t>
             </a:r>
           </a:p>
@@ -9454,7 +11832,7 @@
 </p:sld>
 </file>
 
-<file path=ppt/slides/slide4.xml><?xml version="1.0" encoding="utf-8"?>
+<file path=ppt/slides/slide5.xml><?xml version="1.0" encoding="utf-8"?>
 <p:sld xmlns:a="http://schemas.openxmlformats.org/drawingml/2006/main" xmlns:r="http://schemas.openxmlformats.org/officeDocument/2006/relationships" xmlns:p="http://schemas.openxmlformats.org/presentationml/2006/main">
   <p:cSld>
     <p:bg>
@@ -9874,7 +12252,973 @@
 </p:sld>
 </file>
 
-<file path=ppt/slides/slide5.xml><?xml version="1.0" encoding="utf-8"?>
+<file path=ppt/slides/slide6.xml><?xml version="1.0" encoding="utf-8"?>
+<p:sld xmlns:a="http://schemas.openxmlformats.org/drawingml/2006/main" xmlns:r="http://schemas.openxmlformats.org/officeDocument/2006/relationships" xmlns:p="http://schemas.openxmlformats.org/presentationml/2006/main">
+  <p:cSld>
+    <p:bg>
+      <p:bgPr>
+        <a:solidFill>
+          <a:schemeClr val="bg1"/>
+        </a:solidFill>
+        <a:effectLst/>
+      </p:bgPr>
+    </p:bg>
+    <p:spTree>
+      <p:nvGrpSpPr>
+        <p:cNvPr id="1" name=""/>
+        <p:cNvGrpSpPr/>
+        <p:nvPr/>
+      </p:nvGrpSpPr>
+      <p:grpSpPr>
+        <a:xfrm>
+          <a:off x="0" y="0"/>
+          <a:ext cx="0" cy="0"/>
+          <a:chOff x="0" y="0"/>
+          <a:chExt cx="0" cy="0"/>
+        </a:xfrm>
+      </p:grpSpPr>
+      <p:sp>
+        <p:nvSpPr>
+          <p:cNvPr id="10" name="Rectangle 9">
+            <a:extLst>
+              <a:ext uri="{FF2B5EF4-FFF2-40B4-BE49-F238E27FC236}">
+                <a16:creationId xmlns:a16="http://schemas.microsoft.com/office/drawing/2014/main" id="{F3060C83-F051-4F0E-ABAD-AA0DFC48B218}"/>
+              </a:ext>
+              <a:ext uri="{C183D7F6-B498-43B3-948B-1728B52AA6E4}">
+                <adec:decorative xmlns:adec="http://schemas.microsoft.com/office/drawing/2017/decorative" val="1"/>
+              </a:ext>
+            </a:extLst>
+          </p:cNvPr>
+          <p:cNvSpPr>
+            <a:spLocks noGrp="1" noRot="1" noChangeAspect="1" noMove="1" noResize="1" noEditPoints="1" noAdjustHandles="1" noChangeArrowheads="1" noChangeShapeType="1" noTextEdit="1"/>
+          </p:cNvSpPr>
+          <p:nvPr>
+            <p:extLst>
+              <p:ext uri="{386F3935-93C4-4BCD-93E2-E3B085C9AB24}">
+                <p16:designElem xmlns:p16="http://schemas.microsoft.com/office/powerpoint/2015/main" val="1"/>
+              </p:ext>
+            </p:extLst>
+          </p:nvPr>
+        </p:nvSpPr>
+        <p:spPr>
+          <a:xfrm>
+            <a:off x="0" y="0"/>
+            <a:ext cx="12192000" cy="6858000"/>
+          </a:xfrm>
+          <a:prstGeom prst="rect">
+            <a:avLst/>
+          </a:prstGeom>
+          <a:solidFill>
+            <a:schemeClr val="bg1"/>
+          </a:solidFill>
+          <a:ln>
+            <a:noFill/>
+          </a:ln>
+        </p:spPr>
+        <p:style>
+          <a:lnRef idx="2">
+            <a:schemeClr val="accent1">
+              <a:shade val="50000"/>
+            </a:schemeClr>
+          </a:lnRef>
+          <a:fillRef idx="1">
+            <a:schemeClr val="accent1"/>
+          </a:fillRef>
+          <a:effectRef idx="0">
+            <a:schemeClr val="accent1"/>
+          </a:effectRef>
+          <a:fontRef idx="minor">
+            <a:schemeClr val="lt1"/>
+          </a:fontRef>
+        </p:style>
+        <p:txBody>
+          <a:bodyPr rtlCol="0" anchor="ctr"/>
+          <a:lstStyle/>
+          <a:p>
+            <a:pPr algn="ctr"/>
+            <a:endParaRPr lang="en-US" dirty="0"/>
+          </a:p>
+        </p:txBody>
+      </p:sp>
+      <p:sp>
+        <p:nvSpPr>
+          <p:cNvPr id="12" name="Freeform: Shape 11">
+            <a:extLst>
+              <a:ext uri="{FF2B5EF4-FFF2-40B4-BE49-F238E27FC236}">
+                <a16:creationId xmlns:a16="http://schemas.microsoft.com/office/drawing/2014/main" id="{83C98ABE-055B-441F-B07E-44F97F083C39}"/>
+              </a:ext>
+              <a:ext uri="{C183D7F6-B498-43B3-948B-1728B52AA6E4}">
+                <adec:decorative xmlns:adec="http://schemas.microsoft.com/office/drawing/2017/decorative" val="1"/>
+              </a:ext>
+            </a:extLst>
+          </p:cNvPr>
+          <p:cNvSpPr>
+            <a:spLocks noGrp="1" noRot="1" noChangeAspect="1" noMove="1" noResize="1" noEditPoints="1" noAdjustHandles="1" noChangeArrowheads="1" noChangeShapeType="1" noTextEdit="1"/>
+          </p:cNvSpPr>
+          <p:nvPr>
+            <p:extLst>
+              <p:ext uri="{386F3935-93C4-4BCD-93E2-E3B085C9AB24}">
+                <p16:designElem xmlns:p16="http://schemas.microsoft.com/office/powerpoint/2015/main" val="1"/>
+              </p:ext>
+            </p:extLst>
+          </p:nvPr>
+        </p:nvSpPr>
+        <p:spPr>
+          <a:xfrm rot="18900000" flipH="1">
+            <a:off x="-376156" y="-253670"/>
+            <a:ext cx="1827638" cy="1376989"/>
+          </a:xfrm>
+          <a:custGeom>
+            <a:avLst/>
+            <a:gdLst>
+              <a:gd name="connsiteX0" fmla="*/ 0 w 1827638"/>
+              <a:gd name="connsiteY0" fmla="*/ 987379 h 1376989"/>
+              <a:gd name="connsiteX1" fmla="*/ 987379 w 1827638"/>
+              <a:gd name="connsiteY1" fmla="*/ 0 h 1376989"/>
+              <a:gd name="connsiteX2" fmla="*/ 1827638 w 1827638"/>
+              <a:gd name="connsiteY2" fmla="*/ 840260 h 1376989"/>
+              <a:gd name="connsiteX3" fmla="*/ 1827638 w 1827638"/>
+              <a:gd name="connsiteY3" fmla="*/ 1376989 h 1376989"/>
+              <a:gd name="connsiteX4" fmla="*/ 0 w 1827638"/>
+              <a:gd name="connsiteY4" fmla="*/ 1376989 h 1376989"/>
+            </a:gdLst>
+            <a:ahLst/>
+            <a:cxnLst>
+              <a:cxn ang="0">
+                <a:pos x="connsiteX0" y="connsiteY0"/>
+              </a:cxn>
+              <a:cxn ang="0">
+                <a:pos x="connsiteX1" y="connsiteY1"/>
+              </a:cxn>
+              <a:cxn ang="0">
+                <a:pos x="connsiteX2" y="connsiteY2"/>
+              </a:cxn>
+              <a:cxn ang="0">
+                <a:pos x="connsiteX3" y="connsiteY3"/>
+              </a:cxn>
+              <a:cxn ang="0">
+                <a:pos x="connsiteX4" y="connsiteY4"/>
+              </a:cxn>
+            </a:cxnLst>
+            <a:rect l="l" t="t" r="r" b="b"/>
+            <a:pathLst>
+              <a:path w="1827638" h="1376989">
+                <a:moveTo>
+                  <a:pt x="0" y="987379"/>
+                </a:moveTo>
+                <a:lnTo>
+                  <a:pt x="987379" y="0"/>
+                </a:lnTo>
+                <a:lnTo>
+                  <a:pt x="1827638" y="840260"/>
+                </a:lnTo>
+                <a:lnTo>
+                  <a:pt x="1827638" y="1376989"/>
+                </a:lnTo>
+                <a:lnTo>
+                  <a:pt x="0" y="1376989"/>
+                </a:lnTo>
+                <a:close/>
+              </a:path>
+            </a:pathLst>
+          </a:custGeom>
+          <a:solidFill>
+            <a:schemeClr val="accent1">
+              <a:alpha val="30000"/>
+            </a:schemeClr>
+          </a:solidFill>
+          <a:ln>
+            <a:noFill/>
+          </a:ln>
+        </p:spPr>
+        <p:style>
+          <a:lnRef idx="2">
+            <a:schemeClr val="accent1">
+              <a:shade val="50000"/>
+            </a:schemeClr>
+          </a:lnRef>
+          <a:fillRef idx="1">
+            <a:schemeClr val="accent1"/>
+          </a:fillRef>
+          <a:effectRef idx="0">
+            <a:schemeClr val="accent1"/>
+          </a:effectRef>
+          <a:fontRef idx="minor">
+            <a:schemeClr val="lt1"/>
+          </a:fontRef>
+        </p:style>
+        <p:txBody>
+          <a:bodyPr rtlCol="0" anchor="ctr"/>
+          <a:lstStyle/>
+          <a:p>
+            <a:pPr algn="ctr"/>
+            <a:endParaRPr lang="en-US" dirty="0"/>
+          </a:p>
+        </p:txBody>
+      </p:sp>
+      <p:sp>
+        <p:nvSpPr>
+          <p:cNvPr id="14" name="Rectangle 13">
+            <a:extLst>
+              <a:ext uri="{FF2B5EF4-FFF2-40B4-BE49-F238E27FC236}">
+                <a16:creationId xmlns:a16="http://schemas.microsoft.com/office/drawing/2014/main" id="{29FDB030-9B49-4CED-8CCD-4D99382388AC}"/>
+              </a:ext>
+              <a:ext uri="{C183D7F6-B498-43B3-948B-1728B52AA6E4}">
+                <adec:decorative xmlns:adec="http://schemas.microsoft.com/office/drawing/2017/decorative" val="1"/>
+              </a:ext>
+            </a:extLst>
+          </p:cNvPr>
+          <p:cNvSpPr>
+            <a:spLocks noGrp="1" noRot="1" noChangeAspect="1" noMove="1" noResize="1" noEditPoints="1" noAdjustHandles="1" noChangeArrowheads="1" noChangeShapeType="1" noTextEdit="1"/>
+          </p:cNvSpPr>
+          <p:nvPr>
+            <p:extLst>
+              <p:ext uri="{386F3935-93C4-4BCD-93E2-E3B085C9AB24}">
+                <p16:designElem xmlns:p16="http://schemas.microsoft.com/office/powerpoint/2015/main" val="1"/>
+              </p:ext>
+            </p:extLst>
+          </p:nvPr>
+        </p:nvSpPr>
+        <p:spPr>
+          <a:xfrm rot="18900000" flipH="1">
+            <a:off x="891641" y="422146"/>
+            <a:ext cx="645368" cy="645368"/>
+          </a:xfrm>
+          <a:prstGeom prst="rect">
+            <a:avLst/>
+          </a:prstGeom>
+          <a:solidFill>
+            <a:schemeClr val="accent1">
+              <a:alpha val="30000"/>
+            </a:schemeClr>
+          </a:solidFill>
+          <a:ln>
+            <a:noFill/>
+          </a:ln>
+        </p:spPr>
+        <p:style>
+          <a:lnRef idx="2">
+            <a:schemeClr val="accent1">
+              <a:shade val="50000"/>
+            </a:schemeClr>
+          </a:lnRef>
+          <a:fillRef idx="1">
+            <a:schemeClr val="accent1"/>
+          </a:fillRef>
+          <a:effectRef idx="0">
+            <a:schemeClr val="accent1"/>
+          </a:effectRef>
+          <a:fontRef idx="minor">
+            <a:schemeClr val="lt1"/>
+          </a:fontRef>
+        </p:style>
+        <p:txBody>
+          <a:bodyPr rtlCol="0" anchor="ctr"/>
+          <a:lstStyle/>
+          <a:p>
+            <a:pPr algn="ctr"/>
+            <a:endParaRPr lang="en-US"/>
+          </a:p>
+        </p:txBody>
+      </p:sp>
+      <p:sp>
+        <p:nvSpPr>
+          <p:cNvPr id="16" name="Rectangle 15">
+            <a:extLst>
+              <a:ext uri="{FF2B5EF4-FFF2-40B4-BE49-F238E27FC236}">
+                <a16:creationId xmlns:a16="http://schemas.microsoft.com/office/drawing/2014/main" id="{3783CA14-24A1-485C-8B30-D6A5D87987AD}"/>
+              </a:ext>
+              <a:ext uri="{C183D7F6-B498-43B3-948B-1728B52AA6E4}">
+                <adec:decorative xmlns:adec="http://schemas.microsoft.com/office/drawing/2017/decorative" val="1"/>
+              </a:ext>
+            </a:extLst>
+          </p:cNvPr>
+          <p:cNvSpPr>
+            <a:spLocks noGrp="1" noRot="1" noChangeAspect="1" noMove="1" noResize="1" noEditPoints="1" noAdjustHandles="1" noChangeArrowheads="1" noChangeShapeType="1" noTextEdit="1"/>
+          </p:cNvSpPr>
+          <p:nvPr>
+            <p:extLst>
+              <p:ext uri="{386F3935-93C4-4BCD-93E2-E3B085C9AB24}">
+                <p16:designElem xmlns:p16="http://schemas.microsoft.com/office/powerpoint/2015/main" val="1"/>
+              </p:ext>
+            </p:extLst>
+          </p:nvPr>
+        </p:nvSpPr>
+        <p:spPr>
+          <a:xfrm rot="18900000" flipH="1">
+            <a:off x="10043482" y="655140"/>
+            <a:ext cx="687472" cy="687472"/>
+          </a:xfrm>
+          <a:prstGeom prst="rect">
+            <a:avLst/>
+          </a:prstGeom>
+          <a:solidFill>
+            <a:schemeClr val="accent4">
+              <a:alpha val="30000"/>
+            </a:schemeClr>
+          </a:solidFill>
+          <a:ln>
+            <a:noFill/>
+          </a:ln>
+        </p:spPr>
+        <p:style>
+          <a:lnRef idx="2">
+            <a:schemeClr val="accent1">
+              <a:shade val="50000"/>
+            </a:schemeClr>
+          </a:lnRef>
+          <a:fillRef idx="1">
+            <a:schemeClr val="accent1"/>
+          </a:fillRef>
+          <a:effectRef idx="0">
+            <a:schemeClr val="accent1"/>
+          </a:effectRef>
+          <a:fontRef idx="minor">
+            <a:schemeClr val="lt1"/>
+          </a:fontRef>
+        </p:style>
+        <p:txBody>
+          <a:bodyPr rtlCol="0" anchor="ctr"/>
+          <a:lstStyle/>
+          <a:p>
+            <a:pPr algn="ctr"/>
+            <a:endParaRPr lang="en-US"/>
+          </a:p>
+        </p:txBody>
+      </p:sp>
+      <p:sp>
+        <p:nvSpPr>
+          <p:cNvPr id="18" name="Freeform: Shape 17">
+            <a:extLst>
+              <a:ext uri="{FF2B5EF4-FFF2-40B4-BE49-F238E27FC236}">
+                <a16:creationId xmlns:a16="http://schemas.microsoft.com/office/drawing/2014/main" id="{9A97C86A-04D6-40F7-AE84-31AB43E6A846}"/>
+              </a:ext>
+              <a:ext uri="{C183D7F6-B498-43B3-948B-1728B52AA6E4}">
+                <adec:decorative xmlns:adec="http://schemas.microsoft.com/office/drawing/2017/decorative" val="1"/>
+              </a:ext>
+            </a:extLst>
+          </p:cNvPr>
+          <p:cNvSpPr>
+            <a:spLocks noGrp="1" noRot="1" noChangeAspect="1" noMove="1" noResize="1" noEditPoints="1" noAdjustHandles="1" noChangeArrowheads="1" noChangeShapeType="1" noTextEdit="1"/>
+          </p:cNvSpPr>
+          <p:nvPr>
+            <p:extLst>
+              <p:ext uri="{386F3935-93C4-4BCD-93E2-E3B085C9AB24}">
+                <p16:designElem xmlns:p16="http://schemas.microsoft.com/office/powerpoint/2015/main" val="1"/>
+              </p:ext>
+            </p:extLst>
+          </p:nvPr>
+        </p:nvSpPr>
+        <p:spPr>
+          <a:xfrm rot="10800000" flipH="1">
+            <a:off x="9356643" y="0"/>
+            <a:ext cx="2835357" cy="1480837"/>
+          </a:xfrm>
+          <a:custGeom>
+            <a:avLst/>
+            <a:gdLst>
+              <a:gd name="connsiteX0" fmla="*/ 2835357 w 2835357"/>
+              <a:gd name="connsiteY0" fmla="*/ 1480837 h 1480837"/>
+              <a:gd name="connsiteX1" fmla="*/ 0 w 2835357"/>
+              <a:gd name="connsiteY1" fmla="*/ 1480837 h 1480837"/>
+              <a:gd name="connsiteX2" fmla="*/ 1552727 w 2835357"/>
+              <a:gd name="connsiteY2" fmla="*/ 0 h 1480837"/>
+              <a:gd name="connsiteX3" fmla="*/ 2835357 w 2835357"/>
+              <a:gd name="connsiteY3" fmla="*/ 1223245 h 1480837"/>
+            </a:gdLst>
+            <a:ahLst/>
+            <a:cxnLst>
+              <a:cxn ang="0">
+                <a:pos x="connsiteX0" y="connsiteY0"/>
+              </a:cxn>
+              <a:cxn ang="0">
+                <a:pos x="connsiteX1" y="connsiteY1"/>
+              </a:cxn>
+              <a:cxn ang="0">
+                <a:pos x="connsiteX2" y="connsiteY2"/>
+              </a:cxn>
+              <a:cxn ang="0">
+                <a:pos x="connsiteX3" y="connsiteY3"/>
+              </a:cxn>
+            </a:cxnLst>
+            <a:rect l="l" t="t" r="r" b="b"/>
+            <a:pathLst>
+              <a:path w="2835357" h="1480837">
+                <a:moveTo>
+                  <a:pt x="2835357" y="1480837"/>
+                </a:moveTo>
+                <a:lnTo>
+                  <a:pt x="0" y="1480837"/>
+                </a:lnTo>
+                <a:lnTo>
+                  <a:pt x="1552727" y="0"/>
+                </a:lnTo>
+                <a:lnTo>
+                  <a:pt x="2835357" y="1223245"/>
+                </a:lnTo>
+                <a:close/>
+              </a:path>
+            </a:pathLst>
+          </a:custGeom>
+          <a:solidFill>
+            <a:schemeClr val="accent4">
+              <a:alpha val="30000"/>
+            </a:schemeClr>
+          </a:solidFill>
+          <a:ln>
+            <a:noFill/>
+          </a:ln>
+        </p:spPr>
+        <p:style>
+          <a:lnRef idx="2">
+            <a:schemeClr val="accent1">
+              <a:shade val="50000"/>
+            </a:schemeClr>
+          </a:lnRef>
+          <a:fillRef idx="1">
+            <a:schemeClr val="accent1"/>
+          </a:fillRef>
+          <a:effectRef idx="0">
+            <a:schemeClr val="accent1"/>
+          </a:effectRef>
+          <a:fontRef idx="minor">
+            <a:schemeClr val="lt1"/>
+          </a:fontRef>
+        </p:style>
+        <p:txBody>
+          <a:bodyPr wrap="square" rtlCol="0" anchor="ctr">
+            <a:noAutofit/>
+          </a:bodyPr>
+          <a:lstStyle/>
+          <a:p>
+            <a:pPr algn="ctr"/>
+            <a:endParaRPr lang="en-US" dirty="0"/>
+          </a:p>
+        </p:txBody>
+      </p:sp>
+      <p:sp>
+        <p:nvSpPr>
+          <p:cNvPr id="20" name="Isosceles Triangle 19">
+            <a:extLst>
+              <a:ext uri="{FF2B5EF4-FFF2-40B4-BE49-F238E27FC236}">
+                <a16:creationId xmlns:a16="http://schemas.microsoft.com/office/drawing/2014/main" id="{FF9F2414-84E8-453E-B1F3-389FDE8192D9}"/>
+              </a:ext>
+              <a:ext uri="{C183D7F6-B498-43B3-948B-1728B52AA6E4}">
+                <adec:decorative xmlns:adec="http://schemas.microsoft.com/office/drawing/2017/decorative" val="1"/>
+              </a:ext>
+            </a:extLst>
+          </p:cNvPr>
+          <p:cNvSpPr>
+            <a:spLocks noGrp="1" noRot="1" noChangeAspect="1" noMove="1" noResize="1" noEditPoints="1" noAdjustHandles="1" noChangeArrowheads="1" noChangeShapeType="1" noTextEdit="1"/>
+          </p:cNvSpPr>
+          <p:nvPr>
+            <p:extLst>
+              <p:ext uri="{386F3935-93C4-4BCD-93E2-E3B085C9AB24}">
+                <p16:designElem xmlns:p16="http://schemas.microsoft.com/office/powerpoint/2015/main" val="1"/>
+              </p:ext>
+            </p:extLst>
+          </p:nvPr>
+        </p:nvSpPr>
+        <p:spPr>
+          <a:xfrm flipH="1">
+            <a:off x="7976344" y="6115501"/>
+            <a:ext cx="1494513" cy="742499"/>
+          </a:xfrm>
+          <a:prstGeom prst="triangle">
+            <a:avLst/>
+          </a:prstGeom>
+          <a:solidFill>
+            <a:schemeClr val="accent1">
+              <a:alpha val="30000"/>
+            </a:schemeClr>
+          </a:solidFill>
+          <a:ln>
+            <a:noFill/>
+          </a:ln>
+        </p:spPr>
+        <p:style>
+          <a:lnRef idx="2">
+            <a:schemeClr val="accent1">
+              <a:shade val="50000"/>
+            </a:schemeClr>
+          </a:lnRef>
+          <a:fillRef idx="1">
+            <a:schemeClr val="accent1"/>
+          </a:fillRef>
+          <a:effectRef idx="0">
+            <a:schemeClr val="accent1"/>
+          </a:effectRef>
+          <a:fontRef idx="minor">
+            <a:schemeClr val="lt1"/>
+          </a:fontRef>
+        </p:style>
+        <p:txBody>
+          <a:bodyPr rtlCol="0" anchor="ctr"/>
+          <a:lstStyle/>
+          <a:p>
+            <a:pPr algn="ctr"/>
+            <a:endParaRPr lang="en-US"/>
+          </a:p>
+        </p:txBody>
+      </p:sp>
+      <p:sp>
+        <p:nvSpPr>
+          <p:cNvPr id="22" name="Isosceles Triangle 21">
+            <a:extLst>
+              <a:ext uri="{FF2B5EF4-FFF2-40B4-BE49-F238E27FC236}">
+                <a16:creationId xmlns:a16="http://schemas.microsoft.com/office/drawing/2014/main" id="{3ECA69A1-7536-43AC-85EF-C7106179F5ED}"/>
+              </a:ext>
+              <a:ext uri="{C183D7F6-B498-43B3-948B-1728B52AA6E4}">
+                <adec:decorative xmlns:adec="http://schemas.microsoft.com/office/drawing/2017/decorative" val="1"/>
+              </a:ext>
+            </a:extLst>
+          </p:cNvPr>
+          <p:cNvSpPr>
+            <a:spLocks noGrp="1" noRot="1" noChangeAspect="1" noMove="1" noResize="1" noEditPoints="1" noAdjustHandles="1" noChangeArrowheads="1" noChangeShapeType="1" noTextEdit="1"/>
+          </p:cNvSpPr>
+          <p:nvPr>
+            <p:extLst>
+              <p:ext uri="{386F3935-93C4-4BCD-93E2-E3B085C9AB24}">
+                <p16:designElem xmlns:p16="http://schemas.microsoft.com/office/powerpoint/2015/main" val="1"/>
+              </p:ext>
+            </p:extLst>
+          </p:nvPr>
+        </p:nvSpPr>
+        <p:spPr>
+          <a:xfrm flipH="1">
+            <a:off x="7604080" y="6453143"/>
+            <a:ext cx="814903" cy="404857"/>
+          </a:xfrm>
+          <a:prstGeom prst="triangle">
+            <a:avLst/>
+          </a:prstGeom>
+          <a:solidFill>
+            <a:schemeClr val="accent1">
+              <a:alpha val="30000"/>
+            </a:schemeClr>
+          </a:solidFill>
+          <a:ln>
+            <a:noFill/>
+          </a:ln>
+        </p:spPr>
+        <p:style>
+          <a:lnRef idx="2">
+            <a:schemeClr val="accent1">
+              <a:shade val="50000"/>
+            </a:schemeClr>
+          </a:lnRef>
+          <a:fillRef idx="1">
+            <a:schemeClr val="accent1"/>
+          </a:fillRef>
+          <a:effectRef idx="0">
+            <a:schemeClr val="accent1"/>
+          </a:effectRef>
+          <a:fontRef idx="minor">
+            <a:schemeClr val="lt1"/>
+          </a:fontRef>
+        </p:style>
+        <p:txBody>
+          <a:bodyPr rtlCol="0" anchor="ctr"/>
+          <a:lstStyle/>
+          <a:p>
+            <a:pPr algn="ctr"/>
+            <a:endParaRPr lang="en-US"/>
+          </a:p>
+        </p:txBody>
+      </p:sp>
+      <p:graphicFrame>
+        <p:nvGraphicFramePr>
+          <p:cNvPr id="5" name="Table 5">
+            <a:extLst>
+              <a:ext uri="{FF2B5EF4-FFF2-40B4-BE49-F238E27FC236}">
+                <a16:creationId xmlns:a16="http://schemas.microsoft.com/office/drawing/2014/main" id="{CC062BA9-FDF4-19E4-F217-FCDAE4169FD5}"/>
+              </a:ext>
+            </a:extLst>
+          </p:cNvPr>
+          <p:cNvGraphicFramePr>
+            <a:graphicFrameLocks noGrp="1"/>
+          </p:cNvGraphicFramePr>
+          <p:nvPr>
+            <p:extLst>
+              <p:ext uri="{D42A27DB-BD31-4B8C-83A1-F6EECF244321}">
+                <p14:modId xmlns:p14="http://schemas.microsoft.com/office/powerpoint/2010/main" val="2224071474"/>
+              </p:ext>
+            </p:extLst>
+          </p:nvPr>
+        </p:nvGraphicFramePr>
+        <p:xfrm>
+          <a:off x="1611542" y="1362836"/>
+          <a:ext cx="8968916" cy="4132326"/>
+        </p:xfrm>
+        <a:graphic>
+          <a:graphicData uri="http://schemas.openxmlformats.org/drawingml/2006/table">
+            <a:tbl>
+              <a:tblPr firstRow="1" bandRow="1">
+                <a:noFill/>
+                <a:tableStyleId>{5C22544A-7EE6-4342-B048-85BDC9FD1C3A}</a:tableStyleId>
+              </a:tblPr>
+              <a:tblGrid>
+                <a:gridCol w="7200314">
+                  <a:extLst>
+                    <a:ext uri="{9D8B030D-6E8A-4147-A177-3AD203B41FA5}">
+                      <a16:colId xmlns:a16="http://schemas.microsoft.com/office/drawing/2014/main" val="1310152373"/>
+                    </a:ext>
+                  </a:extLst>
+                </a:gridCol>
+                <a:gridCol w="1768602">
+                  <a:extLst>
+                    <a:ext uri="{9D8B030D-6E8A-4147-A177-3AD203B41FA5}">
+                      <a16:colId xmlns:a16="http://schemas.microsoft.com/office/drawing/2014/main" val="3602471781"/>
+                    </a:ext>
+                  </a:extLst>
+                </a:gridCol>
+              </a:tblGrid>
+              <a:tr h="1190244">
+                <a:tc>
+                  <a:txBody>
+                    <a:bodyPr/>
+                    <a:lstStyle/>
+                    <a:p>
+                      <a:r>
+                        <a:rPr lang="en-US" sz="3900" b="1" cap="none" spc="0">
+                          <a:solidFill>
+                            <a:schemeClr val="bg1"/>
+                          </a:solidFill>
+                        </a:rPr>
+                        <a:t>Total number of observation</a:t>
+                      </a:r>
+                      <a:endParaRPr lang="en-KE" sz="3900" b="1" cap="none" spc="0">
+                        <a:solidFill>
+                          <a:schemeClr val="bg1"/>
+                        </a:solidFill>
+                      </a:endParaRPr>
+                    </a:p>
+                  </a:txBody>
+                  <a:tcPr marL="176022" marR="125730" marT="251460" marB="251460" anchor="ctr">
+                    <a:lnL w="12700" cmpd="sng">
+                      <a:noFill/>
+                    </a:lnL>
+                    <a:lnR w="12700" cmpd="sng">
+                      <a:noFill/>
+                    </a:lnR>
+                    <a:lnT w="19050" cap="flat" cmpd="sng" algn="ctr">
+                      <a:noFill/>
+                      <a:prstDash val="solid"/>
+                    </a:lnT>
+                    <a:lnB w="38100" cmpd="sng">
+                      <a:noFill/>
+                    </a:lnB>
+                    <a:solidFill>
+                      <a:schemeClr val="tx1"/>
+                    </a:solidFill>
+                  </a:tcPr>
+                </a:tc>
+                <a:tc>
+                  <a:txBody>
+                    <a:bodyPr/>
+                    <a:lstStyle/>
+                    <a:p>
+                      <a:endParaRPr lang="en-KE" sz="3900" b="1" cap="none" spc="0">
+                        <a:solidFill>
+                          <a:schemeClr val="bg1"/>
+                        </a:solidFill>
+                      </a:endParaRPr>
+                    </a:p>
+                  </a:txBody>
+                  <a:tcPr marL="176022" marR="125730" marT="251460" marB="251460" anchor="ctr">
+                    <a:lnL w="12700" cmpd="sng">
+                      <a:noFill/>
+                    </a:lnL>
+                    <a:lnR w="12700" cmpd="sng">
+                      <a:noFill/>
+                    </a:lnR>
+                    <a:lnT w="19050" cap="flat" cmpd="sng" algn="ctr">
+                      <a:noFill/>
+                      <a:prstDash val="solid"/>
+                    </a:lnT>
+                    <a:lnB w="38100" cmpd="sng">
+                      <a:noFill/>
+                    </a:lnB>
+                    <a:solidFill>
+                      <a:schemeClr val="tx1"/>
+                    </a:solidFill>
+                  </a:tcPr>
+                </a:tc>
+                <a:extLst>
+                  <a:ext uri="{0D108BD9-81ED-4DB2-BD59-A6C34878D82A}">
+                    <a16:rowId xmlns:a16="http://schemas.microsoft.com/office/drawing/2014/main" val="258419646"/>
+                  </a:ext>
+                </a:extLst>
+              </a:tr>
+              <a:tr h="980694">
+                <a:tc>
+                  <a:txBody>
+                    <a:bodyPr/>
+                    <a:lstStyle/>
+                    <a:p>
+                      <a:r>
+                        <a:rPr lang="en-US" sz="3300" cap="none" spc="0">
+                          <a:solidFill>
+                            <a:schemeClr val="tx1"/>
+                          </a:solidFill>
+                        </a:rPr>
+                        <a:t>Total number of features</a:t>
+                      </a:r>
+                      <a:endParaRPr lang="en-KE" sz="3300" cap="none" spc="0">
+                        <a:solidFill>
+                          <a:schemeClr val="tx1"/>
+                        </a:solidFill>
+                      </a:endParaRPr>
+                    </a:p>
+                  </a:txBody>
+                  <a:tcPr marL="176022" marR="125730" marT="125730" marB="251460">
+                    <a:lnL w="12700" cmpd="sng">
+                      <a:noFill/>
+                      <a:prstDash val="solid"/>
+                    </a:lnL>
+                    <a:lnR w="12700" cmpd="sng">
+                      <a:noFill/>
+                      <a:prstDash val="solid"/>
+                    </a:lnR>
+                    <a:lnT w="38100" cmpd="sng">
+                      <a:noFill/>
+                    </a:lnT>
+                    <a:lnB w="12700" cap="flat" cmpd="sng" algn="ctr">
+                      <a:solidFill>
+                        <a:schemeClr val="tx1"/>
+                      </a:solidFill>
+                      <a:prstDash val="solid"/>
+                    </a:lnB>
+                    <a:noFill/>
+                  </a:tcPr>
+                </a:tc>
+                <a:tc>
+                  <a:txBody>
+                    <a:bodyPr/>
+                    <a:lstStyle/>
+                    <a:p>
+                      <a:endParaRPr lang="en-KE" sz="3300" cap="none" spc="0">
+                        <a:solidFill>
+                          <a:schemeClr val="tx1"/>
+                        </a:solidFill>
+                      </a:endParaRPr>
+                    </a:p>
+                  </a:txBody>
+                  <a:tcPr marL="176022" marR="125730" marT="125730" marB="251460">
+                    <a:lnL w="12700" cmpd="sng">
+                      <a:noFill/>
+                      <a:prstDash val="solid"/>
+                    </a:lnL>
+                    <a:lnR w="12700" cmpd="sng">
+                      <a:noFill/>
+                      <a:prstDash val="solid"/>
+                    </a:lnR>
+                    <a:lnT w="38100" cmpd="sng">
+                      <a:noFill/>
+                    </a:lnT>
+                    <a:lnB w="12700" cap="flat" cmpd="sng" algn="ctr">
+                      <a:solidFill>
+                        <a:schemeClr val="tx1"/>
+                      </a:solidFill>
+                      <a:prstDash val="solid"/>
+                    </a:lnB>
+                    <a:noFill/>
+                  </a:tcPr>
+                </a:tc>
+                <a:extLst>
+                  <a:ext uri="{0D108BD9-81ED-4DB2-BD59-A6C34878D82A}">
+                    <a16:rowId xmlns:a16="http://schemas.microsoft.com/office/drawing/2014/main" val="925194469"/>
+                  </a:ext>
+                </a:extLst>
+              </a:tr>
+              <a:tr h="980694">
+                <a:tc>
+                  <a:txBody>
+                    <a:bodyPr/>
+                    <a:lstStyle/>
+                    <a:p>
+                      <a:r>
+                        <a:rPr lang="en-US" sz="3300" cap="none" spc="0">
+                          <a:solidFill>
+                            <a:schemeClr val="tx1"/>
+                          </a:solidFill>
+                        </a:rPr>
+                        <a:t>Base format of the file</a:t>
+                      </a:r>
+                      <a:endParaRPr lang="en-KE" sz="3300" cap="none" spc="0">
+                        <a:solidFill>
+                          <a:schemeClr val="tx1"/>
+                        </a:solidFill>
+                      </a:endParaRPr>
+                    </a:p>
+                  </a:txBody>
+                  <a:tcPr marL="176022" marR="125730" marT="125730" marB="251460">
+                    <a:lnL w="12700" cmpd="sng">
+                      <a:noFill/>
+                      <a:prstDash val="solid"/>
+                    </a:lnL>
+                    <a:lnR w="12700" cmpd="sng">
+                      <a:noFill/>
+                      <a:prstDash val="solid"/>
+                    </a:lnR>
+                    <a:lnT w="12700" cap="flat" cmpd="sng" algn="ctr">
+                      <a:solidFill>
+                        <a:schemeClr val="tx1"/>
+                      </a:solidFill>
+                      <a:prstDash val="solid"/>
+                    </a:lnT>
+                    <a:lnB w="12700" cmpd="sng">
+                      <a:noFill/>
+                      <a:prstDash val="solid"/>
+                    </a:lnB>
+                    <a:solidFill>
+                      <a:schemeClr val="bg1">
+                        <a:lumMod val="95000"/>
+                      </a:schemeClr>
+                    </a:solidFill>
+                  </a:tcPr>
+                </a:tc>
+                <a:tc>
+                  <a:txBody>
+                    <a:bodyPr/>
+                    <a:lstStyle/>
+                    <a:p>
+                      <a:endParaRPr lang="en-KE" sz="3300" cap="none" spc="0">
+                        <a:solidFill>
+                          <a:schemeClr val="tx1"/>
+                        </a:solidFill>
+                      </a:endParaRPr>
+                    </a:p>
+                  </a:txBody>
+                  <a:tcPr marL="176022" marR="125730" marT="125730" marB="251460">
+                    <a:lnL w="12700" cmpd="sng">
+                      <a:noFill/>
+                      <a:prstDash val="solid"/>
+                    </a:lnL>
+                    <a:lnR w="12700" cmpd="sng">
+                      <a:noFill/>
+                      <a:prstDash val="solid"/>
+                    </a:lnR>
+                    <a:lnT w="12700" cap="flat" cmpd="sng" algn="ctr">
+                      <a:solidFill>
+                        <a:schemeClr val="tx1"/>
+                      </a:solidFill>
+                      <a:prstDash val="solid"/>
+                    </a:lnT>
+                    <a:lnB w="12700" cmpd="sng">
+                      <a:noFill/>
+                      <a:prstDash val="solid"/>
+                    </a:lnB>
+                    <a:solidFill>
+                      <a:schemeClr val="bg1">
+                        <a:lumMod val="95000"/>
+                      </a:schemeClr>
+                    </a:solidFill>
+                  </a:tcPr>
+                </a:tc>
+                <a:extLst>
+                  <a:ext uri="{0D108BD9-81ED-4DB2-BD59-A6C34878D82A}">
+                    <a16:rowId xmlns:a16="http://schemas.microsoft.com/office/drawing/2014/main" val="3384269822"/>
+                  </a:ext>
+                </a:extLst>
+              </a:tr>
+              <a:tr h="980694">
+                <a:tc>
+                  <a:txBody>
+                    <a:bodyPr/>
+                    <a:lstStyle/>
+                    <a:p>
+                      <a:r>
+                        <a:rPr lang="en-US" sz="3300" cap="none" spc="0">
+                          <a:solidFill>
+                            <a:schemeClr val="tx1"/>
+                          </a:solidFill>
+                        </a:rPr>
+                        <a:t>Size of the data</a:t>
+                      </a:r>
+                      <a:endParaRPr lang="en-KE" sz="3300" cap="none" spc="0">
+                        <a:solidFill>
+                          <a:schemeClr val="tx1"/>
+                        </a:solidFill>
+                      </a:endParaRPr>
+                    </a:p>
+                  </a:txBody>
+                  <a:tcPr marL="176022" marR="125730" marT="125730" marB="251460">
+                    <a:lnL w="12700" cmpd="sng">
+                      <a:noFill/>
+                      <a:prstDash val="solid"/>
+                    </a:lnL>
+                    <a:lnR w="12700" cmpd="sng">
+                      <a:noFill/>
+                      <a:prstDash val="solid"/>
+                    </a:lnR>
+                    <a:lnT w="12700" cmpd="sng">
+                      <a:noFill/>
+                      <a:prstDash val="solid"/>
+                    </a:lnT>
+                    <a:lnB w="12700" cmpd="sng">
+                      <a:noFill/>
+                      <a:prstDash val="solid"/>
+                    </a:lnB>
+                    <a:noFill/>
+                  </a:tcPr>
+                </a:tc>
+                <a:tc>
+                  <a:txBody>
+                    <a:bodyPr/>
+                    <a:lstStyle/>
+                    <a:p>
+                      <a:endParaRPr lang="en-KE" sz="3300" cap="none" spc="0">
+                        <a:solidFill>
+                          <a:schemeClr val="tx1"/>
+                        </a:solidFill>
+                      </a:endParaRPr>
+                    </a:p>
+                  </a:txBody>
+                  <a:tcPr marL="176022" marR="125730" marT="125730" marB="251460">
+                    <a:lnL w="12700" cmpd="sng">
+                      <a:noFill/>
+                      <a:prstDash val="solid"/>
+                    </a:lnL>
+                    <a:lnR w="12700" cmpd="sng">
+                      <a:noFill/>
+                      <a:prstDash val="solid"/>
+                    </a:lnR>
+                    <a:lnT w="12700" cmpd="sng">
+                      <a:noFill/>
+                      <a:prstDash val="solid"/>
+                    </a:lnT>
+                    <a:lnB w="12700" cmpd="sng">
+                      <a:noFill/>
+                      <a:prstDash val="solid"/>
+                    </a:lnB>
+                    <a:noFill/>
+                  </a:tcPr>
+                </a:tc>
+                <a:extLst>
+                  <a:ext uri="{0D108BD9-81ED-4DB2-BD59-A6C34878D82A}">
+                    <a16:rowId xmlns:a16="http://schemas.microsoft.com/office/drawing/2014/main" val="2003230526"/>
+                  </a:ext>
+                </a:extLst>
+              </a:tr>
+            </a:tbl>
+          </a:graphicData>
+        </a:graphic>
+      </p:graphicFrame>
+    </p:spTree>
+    <p:extLst>
+      <p:ext uri="{BB962C8B-B14F-4D97-AF65-F5344CB8AC3E}">
+        <p14:creationId xmlns:p14="http://schemas.microsoft.com/office/powerpoint/2010/main" val="2744971054"/>
+      </p:ext>
+    </p:extLst>
+  </p:cSld>
+  <p:clrMapOvr>
+    <a:masterClrMapping/>
+  </p:clrMapOvr>
+</p:sld>
+</file>
+
+<file path=ppt/slides/slide7.xml><?xml version="1.0" encoding="utf-8"?>
 <p:sld xmlns:a="http://schemas.openxmlformats.org/drawingml/2006/main" xmlns:r="http://schemas.openxmlformats.org/officeDocument/2006/relationships" xmlns:p="http://schemas.openxmlformats.org/presentationml/2006/main">
   <p:cSld>
     <p:bg>
@@ -10268,7 +13612,7 @@
 </p:sld>
 </file>
 
-<file path=ppt/slides/slide6.xml><?xml version="1.0" encoding="utf-8"?>
+<file path=ppt/slides/slide8.xml><?xml version="1.0" encoding="utf-8"?>
 <p:sld xmlns:a="http://schemas.openxmlformats.org/drawingml/2006/main" xmlns:r="http://schemas.openxmlformats.org/officeDocument/2006/relationships" xmlns:p="http://schemas.openxmlformats.org/presentationml/2006/main">
   <p:cSld>
     <p:bg>
@@ -10753,7 +14097,7 @@
 </p:sld>
 </file>
 
-<file path=ppt/slides/slide7.xml><?xml version="1.0" encoding="utf-8"?>
+<file path=ppt/slides/slide9.xml><?xml version="1.0" encoding="utf-8"?>
 <p:sld xmlns:a="http://schemas.openxmlformats.org/drawingml/2006/main" xmlns:r="http://schemas.openxmlformats.org/officeDocument/2006/relationships" xmlns:p="http://schemas.openxmlformats.org/presentationml/2006/main">
   <p:cSld>
     <p:bg>
@@ -11474,323 +14818,6 @@
     <p:extLst>
       <p:ext uri="{BB962C8B-B14F-4D97-AF65-F5344CB8AC3E}">
         <p14:creationId xmlns:p14="http://schemas.microsoft.com/office/powerpoint/2010/main" val="3601859859"/>
-      </p:ext>
-    </p:extLst>
-  </p:cSld>
-  <p:clrMapOvr>
-    <a:masterClrMapping/>
-  </p:clrMapOvr>
-</p:sld>
-</file>
-
-<file path=ppt/slides/slide8.xml><?xml version="1.0" encoding="utf-8"?>
-<p:sld xmlns:a="http://schemas.openxmlformats.org/drawingml/2006/main" xmlns:r="http://schemas.openxmlformats.org/officeDocument/2006/relationships" xmlns:p="http://schemas.openxmlformats.org/presentationml/2006/main">
-  <p:cSld>
-    <p:spTree>
-      <p:nvGrpSpPr>
-        <p:cNvPr id="1" name=""/>
-        <p:cNvGrpSpPr/>
-        <p:nvPr/>
-      </p:nvGrpSpPr>
-      <p:grpSpPr>
-        <a:xfrm>
-          <a:off x="0" y="0"/>
-          <a:ext cx="0" cy="0"/>
-          <a:chOff x="0" y="0"/>
-          <a:chExt cx="0" cy="0"/>
-        </a:xfrm>
-      </p:grpSpPr>
-      <p:sp>
-        <p:nvSpPr>
-          <p:cNvPr id="2" name="Title 1">
-            <a:extLst>
-              <a:ext uri="{FF2B5EF4-FFF2-40B4-BE49-F238E27FC236}">
-                <a16:creationId xmlns:a16="http://schemas.microsoft.com/office/drawing/2014/main" id="{286EF2C1-7214-1F0E-C106-2CF1F8584584}"/>
-              </a:ext>
-            </a:extLst>
-          </p:cNvPr>
-          <p:cNvSpPr>
-            <a:spLocks noGrp="1"/>
-          </p:cNvSpPr>
-          <p:nvPr>
-            <p:ph type="title"/>
-          </p:nvPr>
-        </p:nvSpPr>
-        <p:spPr/>
-        <p:txBody>
-          <a:bodyPr/>
-          <a:lstStyle/>
-          <a:p>
-            <a:r>
-              <a:rPr lang="en-US" dirty="0">
-                <a:latin typeface="Abadi" panose="020B0604020104020204" pitchFamily="34" charset="0"/>
-              </a:rPr>
-              <a:t>People below 40 years earn less income </a:t>
-            </a:r>
-            <a:endParaRPr lang="en-KE" dirty="0">
-              <a:latin typeface="Abadi" panose="020B0604020104020204" pitchFamily="34" charset="0"/>
-            </a:endParaRPr>
-          </a:p>
-        </p:txBody>
-      </p:sp>
-      <p:pic>
-        <p:nvPicPr>
-          <p:cNvPr id="6" name="Content Placeholder 5" descr="A graph of age vs income&#10;&#10;Description automatically generated">
-            <a:extLst>
-              <a:ext uri="{FF2B5EF4-FFF2-40B4-BE49-F238E27FC236}">
-                <a16:creationId xmlns:a16="http://schemas.microsoft.com/office/drawing/2014/main" id="{591737C7-3E2F-584B-F0D2-4A4D57EF1B89}"/>
-              </a:ext>
-            </a:extLst>
-          </p:cNvPr>
-          <p:cNvPicPr>
-            <a:picLocks noGrp="1" noChangeAspect="1"/>
-          </p:cNvPicPr>
-          <p:nvPr>
-            <p:ph idx="1"/>
-          </p:nvPr>
-        </p:nvPicPr>
-        <p:blipFill>
-          <a:blip r:embed="rId2">
-            <a:extLst>
-              <a:ext uri="{28A0092B-C50C-407E-A947-70E740481C1C}">
-                <a14:useLocalDpi xmlns:a14="http://schemas.microsoft.com/office/drawing/2010/main" val="0"/>
-              </a:ext>
-            </a:extLst>
-          </a:blip>
-          <a:stretch>
-            <a:fillRect/>
-          </a:stretch>
-        </p:blipFill>
-        <p:spPr>
-          <a:xfrm>
-            <a:off x="5576374" y="1343973"/>
-            <a:ext cx="5385827" cy="4160528"/>
-          </a:xfrm>
-        </p:spPr>
-      </p:pic>
-      <p:sp>
-        <p:nvSpPr>
-          <p:cNvPr id="4" name="Text Placeholder 3">
-            <a:extLst>
-              <a:ext uri="{FF2B5EF4-FFF2-40B4-BE49-F238E27FC236}">
-                <a16:creationId xmlns:a16="http://schemas.microsoft.com/office/drawing/2014/main" id="{89C988BC-9B8D-AD50-5051-416BF630423A}"/>
-              </a:ext>
-            </a:extLst>
-          </p:cNvPr>
-          <p:cNvSpPr>
-            <a:spLocks noGrp="1"/>
-          </p:cNvSpPr>
-          <p:nvPr>
-            <p:ph type="body" sz="half" idx="2"/>
-          </p:nvPr>
-        </p:nvSpPr>
-        <p:spPr/>
-        <p:txBody>
-          <a:bodyPr/>
-          <a:lstStyle/>
-          <a:p>
-            <a:pPr marL="285750" indent="-285750">
-              <a:buFont typeface="Wingdings" panose="05000000000000000000" pitchFamily="2" charset="2"/>
-              <a:buChar char="§"/>
-            </a:pPr>
-            <a:r>
-              <a:rPr lang="en-US" dirty="0"/>
-              <a:t>Less expensive products should be manufactured to improve stocking.</a:t>
-            </a:r>
-            <a:endParaRPr lang="en-KE" dirty="0"/>
-          </a:p>
-        </p:txBody>
-      </p:sp>
-    </p:spTree>
-    <p:extLst>
-      <p:ext uri="{BB962C8B-B14F-4D97-AF65-F5344CB8AC3E}">
-        <p14:creationId xmlns:p14="http://schemas.microsoft.com/office/powerpoint/2010/main" val="2414125523"/>
-      </p:ext>
-    </p:extLst>
-  </p:cSld>
-  <p:clrMapOvr>
-    <a:masterClrMapping/>
-  </p:clrMapOvr>
-</p:sld>
-</file>
-
-<file path=ppt/slides/slide9.xml><?xml version="1.0" encoding="utf-8"?>
-<p:sld xmlns:a="http://schemas.openxmlformats.org/drawingml/2006/main" xmlns:r="http://schemas.openxmlformats.org/officeDocument/2006/relationships" xmlns:p="http://schemas.openxmlformats.org/presentationml/2006/main">
-  <p:cSld>
-    <p:bg>
-      <p:bgPr>
-        <a:solidFill>
-          <a:schemeClr val="bg1"/>
-        </a:solidFill>
-        <a:effectLst/>
-      </p:bgPr>
-    </p:bg>
-    <p:spTree>
-      <p:nvGrpSpPr>
-        <p:cNvPr id="1" name=""/>
-        <p:cNvGrpSpPr/>
-        <p:nvPr/>
-      </p:nvGrpSpPr>
-      <p:grpSpPr>
-        <a:xfrm>
-          <a:off x="0" y="0"/>
-          <a:ext cx="0" cy="0"/>
-          <a:chOff x="0" y="0"/>
-          <a:chExt cx="0" cy="0"/>
-        </a:xfrm>
-      </p:grpSpPr>
-      <p:sp>
-        <p:nvSpPr>
-          <p:cNvPr id="21" name="Down Arrow 7">
-            <a:extLst>
-              <a:ext uri="{FF2B5EF4-FFF2-40B4-BE49-F238E27FC236}">
-                <a16:creationId xmlns:a16="http://schemas.microsoft.com/office/drawing/2014/main" id="{D4771268-CB57-404A-9271-370EB28F6090}"/>
-              </a:ext>
-              <a:ext uri="{C183D7F6-B498-43B3-948B-1728B52AA6E4}">
-                <adec:decorative xmlns:adec="http://schemas.microsoft.com/office/drawing/2017/decorative" val="1"/>
-              </a:ext>
-            </a:extLst>
-          </p:cNvPr>
-          <p:cNvSpPr>
-            <a:spLocks noGrp="1" noRot="1" noChangeAspect="1" noMove="1" noResize="1" noEditPoints="1" noAdjustHandles="1" noChangeArrowheads="1" noChangeShapeType="1" noTextEdit="1"/>
-          </p:cNvSpPr>
-          <p:nvPr>
-            <p:extLst>
-              <p:ext uri="{386F3935-93C4-4BCD-93E2-E3B085C9AB24}">
-                <p16:designElem xmlns:p16="http://schemas.microsoft.com/office/powerpoint/2015/main" val="1"/>
-              </p:ext>
-            </p:extLst>
-          </p:nvPr>
-        </p:nvSpPr>
-        <p:spPr>
-          <a:xfrm rot="16200000">
-            <a:off x="800100" y="1491343"/>
-            <a:ext cx="3333749" cy="3499103"/>
-          </a:xfrm>
-          <a:prstGeom prst="downArrow">
-            <a:avLst>
-              <a:gd name="adj1" fmla="val 100000"/>
-              <a:gd name="adj2" fmla="val 15788"/>
-            </a:avLst>
-          </a:prstGeom>
-          <a:solidFill>
-            <a:srgbClr val="404040"/>
-          </a:solidFill>
-          <a:ln w="53975">
-            <a:noFill/>
-          </a:ln>
-        </p:spPr>
-        <p:style>
-          <a:lnRef idx="2">
-            <a:schemeClr val="accent1">
-              <a:shade val="50000"/>
-            </a:schemeClr>
-          </a:lnRef>
-          <a:fillRef idx="1">
-            <a:schemeClr val="accent1"/>
-          </a:fillRef>
-          <a:effectRef idx="0">
-            <a:schemeClr val="accent1"/>
-          </a:effectRef>
-          <a:fontRef idx="minor">
-            <a:schemeClr val="lt1"/>
-          </a:fontRef>
-        </p:style>
-        <p:txBody>
-          <a:bodyPr rtlCol="0" anchor="ctr"/>
-          <a:lstStyle/>
-          <a:p>
-            <a:pPr algn="ctr"/>
-            <a:endParaRPr lang="en-US"/>
-          </a:p>
-        </p:txBody>
-      </p:sp>
-      <p:sp>
-        <p:nvSpPr>
-          <p:cNvPr id="2" name="Title 1">
-            <a:extLst>
-              <a:ext uri="{FF2B5EF4-FFF2-40B4-BE49-F238E27FC236}">
-                <a16:creationId xmlns:a16="http://schemas.microsoft.com/office/drawing/2014/main" id="{66B80612-D09B-CEB2-39BB-22AAB735A30A}"/>
-              </a:ext>
-            </a:extLst>
-          </p:cNvPr>
-          <p:cNvSpPr>
-            <a:spLocks noGrp="1"/>
-          </p:cNvSpPr>
-          <p:nvPr>
-            <p:ph type="title"/>
-          </p:nvPr>
-        </p:nvSpPr>
-        <p:spPr>
-          <a:xfrm>
-            <a:off x="1028700" y="1967266"/>
-            <a:ext cx="2628900" cy="2547257"/>
-          </a:xfrm>
-          <a:noFill/>
-        </p:spPr>
-        <p:txBody>
-          <a:bodyPr vert="horz" lIns="91440" tIns="45720" rIns="91440" bIns="45720" rtlCol="0" anchor="ctr">
-            <a:normAutofit/>
-          </a:bodyPr>
-          <a:lstStyle/>
-          <a:p>
-            <a:pPr algn="ctr"/>
-            <a:r>
-              <a:rPr lang="en-US" sz="3600" kern="1200" dirty="0">
-                <a:solidFill>
-                  <a:srgbClr val="FFFFFF"/>
-                </a:solidFill>
-                <a:latin typeface="+mj-lt"/>
-                <a:ea typeface="+mj-ea"/>
-                <a:cs typeface="+mj-cs"/>
-              </a:rPr>
-              <a:t>Preferred Payment mode</a:t>
-            </a:r>
-          </a:p>
-        </p:txBody>
-      </p:sp>
-      <p:pic>
-        <p:nvPicPr>
-          <p:cNvPr id="6" name="Content Placeholder 5" descr="A green bar graph with white text&#10;&#10;Description automatically generated">
-            <a:extLst>
-              <a:ext uri="{FF2B5EF4-FFF2-40B4-BE49-F238E27FC236}">
-                <a16:creationId xmlns:a16="http://schemas.microsoft.com/office/drawing/2014/main" id="{1053CF8D-4D7D-181B-73D9-9AEAD633F174}"/>
-              </a:ext>
-            </a:extLst>
-          </p:cNvPr>
-          <p:cNvPicPr>
-            <a:picLocks noGrp="1" noChangeAspect="1"/>
-          </p:cNvPicPr>
-          <p:nvPr>
-            <p:ph idx="1"/>
-          </p:nvPr>
-        </p:nvPicPr>
-        <p:blipFill>
-          <a:blip r:embed="rId2">
-            <a:extLst>
-              <a:ext uri="{28A0092B-C50C-407E-A947-70E740481C1C}">
-                <a14:useLocalDpi xmlns:a14="http://schemas.microsoft.com/office/drawing/2010/main" val="0"/>
-              </a:ext>
-            </a:extLst>
-          </a:blip>
-          <a:stretch>
-            <a:fillRect/>
-          </a:stretch>
-        </p:blipFill>
-        <p:spPr>
-          <a:xfrm>
-            <a:off x="4782415" y="643466"/>
-            <a:ext cx="6770502" cy="5568739"/>
-          </a:xfrm>
-          <a:prstGeom prst="rect">
-            <a:avLst/>
-          </a:prstGeom>
-        </p:spPr>
-      </p:pic>
-    </p:spTree>
-    <p:extLst>
-      <p:ext uri="{BB962C8B-B14F-4D97-AF65-F5344CB8AC3E}">
-        <p14:creationId xmlns:p14="http://schemas.microsoft.com/office/powerpoint/2010/main" val="2859396079"/>
       </p:ext>
     </p:extLst>
   </p:cSld>

</xml_diff>